<commit_message>
Updating the final presentation file
</commit_message>
<xml_diff>
--- a/Handwritten_Mathematical_Expression_Recognition_(Final_Report).pptx
+++ b/Handwritten_Mathematical_Expression_Recognition_(Final_Report).pptx
@@ -5,10 +5,10 @@
     <p:sldMasterId id="2147483648" r:id="rId1"/>
   </p:sldMasterIdLst>
   <p:notesMasterIdLst>
-    <p:notesMasterId r:id="rId21"/>
+    <p:notesMasterId r:id="rId24"/>
   </p:notesMasterIdLst>
   <p:handoutMasterIdLst>
-    <p:handoutMasterId r:id="rId22"/>
+    <p:handoutMasterId r:id="rId25"/>
   </p:handoutMasterIdLst>
   <p:sldIdLst>
     <p:sldId id="383" r:id="rId2"/>
@@ -27,9 +27,12 @@
     <p:sldId id="408" r:id="rId15"/>
     <p:sldId id="409" r:id="rId16"/>
     <p:sldId id="410" r:id="rId17"/>
-    <p:sldId id="394" r:id="rId18"/>
-    <p:sldId id="392" r:id="rId19"/>
-    <p:sldId id="378" r:id="rId20"/>
+    <p:sldId id="412" r:id="rId18"/>
+    <p:sldId id="413" r:id="rId19"/>
+    <p:sldId id="394" r:id="rId20"/>
+    <p:sldId id="411" r:id="rId21"/>
+    <p:sldId id="392" r:id="rId22"/>
+    <p:sldId id="414" r:id="rId23"/>
   </p:sldIdLst>
   <p:sldSz cx="12192000" cy="6858000"/>
   <p:notesSz cx="9388475" cy="7102475"/>
@@ -149,7 +152,10 @@
             <p14:sldId id="408"/>
             <p14:sldId id="409"/>
             <p14:sldId id="410"/>
+            <p14:sldId id="412"/>
+            <p14:sldId id="413"/>
             <p14:sldId id="394"/>
+            <p14:sldId id="411"/>
             <p14:sldId id="392"/>
           </p14:sldIdLst>
         </p14:section>
@@ -157,8 +163,11 @@
           <p14:sldIdLst/>
         </p14:section>
         <p14:section name="THANK YOU" id="{6CD91DAB-8EC3-4802-89E9-0F1C7022FB28}">
+          <p14:sldIdLst/>
+        </p14:section>
+        <p14:section name="Untitled Section" id="{5994F272-C703-4223-A264-80B75B297B2E}">
           <p14:sldIdLst>
-            <p14:sldId id="378"/>
+            <p14:sldId id="414"/>
           </p14:sldIdLst>
         </p14:section>
       </p14:sectionLst>
@@ -5631,39 +5640,6 @@
         </a:p>
       </dgm:t>
     </dgm:pt>
-    <dgm:pt modelId="{F37A32D3-2A91-4B5A-864E-3BF9C09068B0}">
-      <dgm:prSet phldrT="[Text]" phldr="1"/>
-      <dgm:spPr/>
-      <dgm:t>
-        <a:bodyPr/>
-        <a:lstStyle/>
-        <a:p>
-          <a:endParaRPr lang="en-US"/>
-        </a:p>
-      </dgm:t>
-    </dgm:pt>
-    <dgm:pt modelId="{889E013F-A40D-4A82-8203-EF3DEEF2500D}" type="parTrans" cxnId="{0A2ECCB1-9AAF-4AA7-9814-0293E1555B0B}">
-      <dgm:prSet/>
-      <dgm:spPr/>
-      <dgm:t>
-        <a:bodyPr/>
-        <a:lstStyle/>
-        <a:p>
-          <a:endParaRPr lang="en-US"/>
-        </a:p>
-      </dgm:t>
-    </dgm:pt>
-    <dgm:pt modelId="{7055EF58-6AB4-4DCF-B9DE-34984DE49494}" type="sibTrans" cxnId="{0A2ECCB1-9AAF-4AA7-9814-0293E1555B0B}">
-      <dgm:prSet/>
-      <dgm:spPr/>
-      <dgm:t>
-        <a:bodyPr/>
-        <a:lstStyle/>
-        <a:p>
-          <a:endParaRPr lang="en-US"/>
-        </a:p>
-      </dgm:t>
-    </dgm:pt>
     <dgm:pt modelId="{B86C64F4-4039-4D85-94C4-05075ECA0B40}">
       <dgm:prSet phldrT="[Text]"/>
       <dgm:spPr/>
@@ -5700,72 +5676,6 @@
             <a:rPr lang="en-US" dirty="0"/>
             <a:t>CROHME 2013 test set as a validation set</a:t>
           </a:r>
-        </a:p>
-      </dgm:t>
-    </dgm:pt>
-    <dgm:pt modelId="{3DA76829-F80F-4F45-97FF-F50E9FE306A0}">
-      <dgm:prSet phldrT="[Text]" phldr="1"/>
-      <dgm:spPr/>
-      <dgm:t>
-        <a:bodyPr/>
-        <a:lstStyle/>
-        <a:p>
-          <a:endParaRPr lang="en-US"/>
-        </a:p>
-      </dgm:t>
-    </dgm:pt>
-    <dgm:pt modelId="{F721DC08-C5F7-47A2-881F-DE3A1271AF99}" type="parTrans" cxnId="{938C4E04-575B-4D0F-AADA-1C2D572CC094}">
-      <dgm:prSet/>
-      <dgm:spPr/>
-      <dgm:t>
-        <a:bodyPr/>
-        <a:lstStyle/>
-        <a:p>
-          <a:endParaRPr lang="en-US"/>
-        </a:p>
-      </dgm:t>
-    </dgm:pt>
-    <dgm:pt modelId="{E0B04139-BDB9-4CF7-9EF1-844341E1BD6D}" type="sibTrans" cxnId="{938C4E04-575B-4D0F-AADA-1C2D572CC094}">
-      <dgm:prSet/>
-      <dgm:spPr/>
-      <dgm:t>
-        <a:bodyPr/>
-        <a:lstStyle/>
-        <a:p>
-          <a:endParaRPr lang="en-US"/>
-        </a:p>
-      </dgm:t>
-    </dgm:pt>
-    <dgm:pt modelId="{E589B041-58F3-4EE8-A494-0903A25B95DC}">
-      <dgm:prSet phldrT="[Text]" phldr="1"/>
-      <dgm:spPr/>
-      <dgm:t>
-        <a:bodyPr/>
-        <a:lstStyle/>
-        <a:p>
-          <a:endParaRPr lang="en-US" dirty="0"/>
-        </a:p>
-      </dgm:t>
-    </dgm:pt>
-    <dgm:pt modelId="{5AD9C823-9DEC-4440-8687-8234BF5737DF}" type="sibTrans" cxnId="{6706A3F2-B419-45A0-9817-95CA650A42F4}">
-      <dgm:prSet/>
-      <dgm:spPr/>
-      <dgm:t>
-        <a:bodyPr/>
-        <a:lstStyle/>
-        <a:p>
-          <a:endParaRPr lang="en-US"/>
-        </a:p>
-      </dgm:t>
-    </dgm:pt>
-    <dgm:pt modelId="{9E63E1E7-00CB-4BD9-92F4-043BDFBEB2BC}" type="parTrans" cxnId="{6706A3F2-B419-45A0-9817-95CA650A42F4}">
-      <dgm:prSet/>
-      <dgm:spPr/>
-      <dgm:t>
-        <a:bodyPr/>
-        <a:lstStyle/>
-        <a:p>
-          <a:endParaRPr lang="en-US"/>
         </a:p>
       </dgm:t>
     </dgm:pt>
@@ -5900,19 +5810,13 @@
   <dgm:cxnLst>
     <dgm:cxn modelId="{07C90DB1-26D4-45CC-A15E-4932F804F981}" type="presOf" srcId="{31980333-0EF0-4B8C-9599-34FB86A7EEF5}" destId="{C3430BD1-EA04-4388-9A49-E84CF5C9C757}" srcOrd="0" destOrd="0" presId="urn:microsoft.com/office/officeart/2008/layout/AlternatingHexagons"/>
     <dgm:cxn modelId="{465C1214-CA91-4CE3-ABF1-51717A68443A}" type="presOf" srcId="{01DD296D-F52D-43F3-95D8-F798C04EE786}" destId="{1BB9E6BE-18A3-479B-A740-B7E580DDE8CA}" srcOrd="0" destOrd="0" presId="urn:microsoft.com/office/officeart/2008/layout/AlternatingHexagons"/>
-    <dgm:cxn modelId="{94C2570B-9283-4ECE-878A-30E77DB25B1E}" type="presOf" srcId="{E589B041-58F3-4EE8-A494-0903A25B95DC}" destId="{FEE8A351-1CD7-4BD6-98A3-73E090B740D5}" srcOrd="0" destOrd="0" presId="urn:microsoft.com/office/officeart/2008/layout/AlternatingHexagons"/>
     <dgm:cxn modelId="{6A79E7F3-DA9C-42EE-9CED-B9D47425E9AF}" type="presOf" srcId="{748C4DB4-DD0A-4ACA-8F3B-94EBF51DE77A}" destId="{5B6A012B-027A-42B3-9183-AE7345BE1DF3}" srcOrd="0" destOrd="0" presId="urn:microsoft.com/office/officeart/2008/layout/AlternatingHexagons"/>
-    <dgm:cxn modelId="{6706A3F2-B419-45A0-9817-95CA650A42F4}" srcId="{31980333-0EF0-4B8C-9599-34FB86A7EEF5}" destId="{E589B041-58F3-4EE8-A494-0903A25B95DC}" srcOrd="0" destOrd="0" parTransId="{9E63E1E7-00CB-4BD9-92F4-043BDFBEB2BC}" sibTransId="{5AD9C823-9DEC-4440-8687-8234BF5737DF}"/>
     <dgm:cxn modelId="{F976D88C-B03D-47C1-9118-1EA057510796}" srcId="{748C4DB4-DD0A-4ACA-8F3B-94EBF51DE77A}" destId="{B86C64F4-4039-4D85-94C4-05075ECA0B40}" srcOrd="2" destOrd="0" parTransId="{FC1CB9BF-CD19-4507-BE55-CDC5D7AA7B37}" sibTransId="{501DD77C-3B0E-48AD-8F61-E6028996B302}"/>
-    <dgm:cxn modelId="{1331A87F-B0B1-4824-891F-EBAE9B3B4F86}" type="presOf" srcId="{F37A32D3-2A91-4B5A-864E-3BF9C09068B0}" destId="{02E6AB72-0F70-4E3B-B327-0E5150250A52}" srcOrd="0" destOrd="0" presId="urn:microsoft.com/office/officeart/2008/layout/AlternatingHexagons"/>
-    <dgm:cxn modelId="{0A2ECCB1-9AAF-4AA7-9814-0293E1555B0B}" srcId="{F594F115-EEE4-4D9D-B897-AFCB969137D6}" destId="{F37A32D3-2A91-4B5A-864E-3BF9C09068B0}" srcOrd="0" destOrd="0" parTransId="{889E013F-A40D-4A82-8203-EF3DEEF2500D}" sibTransId="{7055EF58-6AB4-4DCF-B9DE-34984DE49494}"/>
     <dgm:cxn modelId="{48D079F1-3179-4A66-B2FD-68DD0674F6EA}" type="presOf" srcId="{A0836B09-D0F9-40CC-ACF9-3B3E561A9D27}" destId="{2D105EDE-8F4D-4159-B583-221AA1BD9DAA}" srcOrd="0" destOrd="0" presId="urn:microsoft.com/office/officeart/2008/layout/AlternatingHexagons"/>
     <dgm:cxn modelId="{BC93659C-3C72-416A-9C83-BADDCE96FBDE}" srcId="{748C4DB4-DD0A-4ACA-8F3B-94EBF51DE77A}" destId="{F594F115-EEE4-4D9D-B897-AFCB969137D6}" srcOrd="1" destOrd="0" parTransId="{4B971543-E272-4366-99C3-68B74240AB10}" sibTransId="{A0836B09-D0F9-40CC-ACF9-3B3E561A9D27}"/>
-    <dgm:cxn modelId="{CB485A6C-BAC5-46DC-9BA2-7F1BD168E8DD}" type="presOf" srcId="{3DA76829-F80F-4F45-97FF-F50E9FE306A0}" destId="{3DEB77F6-E940-45AB-8E6F-DFC5F00F8321}" srcOrd="0" destOrd="0" presId="urn:microsoft.com/office/officeart/2008/layout/AlternatingHexagons"/>
     <dgm:cxn modelId="{EF6EC4A6-D4CB-4A17-902E-91D9326DACB3}" type="presOf" srcId="{F594F115-EEE4-4D9D-B897-AFCB969137D6}" destId="{0C1616D0-0D70-44E7-B378-EEFF74AF8C48}" srcOrd="0" destOrd="0" presId="urn:microsoft.com/office/officeart/2008/layout/AlternatingHexagons"/>
     <dgm:cxn modelId="{9BCE6744-0EE9-45AF-931A-749CD9CCD11B}" srcId="{748C4DB4-DD0A-4ACA-8F3B-94EBF51DE77A}" destId="{31980333-0EF0-4B8C-9599-34FB86A7EEF5}" srcOrd="0" destOrd="0" parTransId="{58DBFDE1-0EE9-4385-AB47-1C17506B70CF}" sibTransId="{01DD296D-F52D-43F3-95D8-F798C04EE786}"/>
     <dgm:cxn modelId="{8E74C180-D3B5-47E3-89C0-67C23DDEA91D}" type="presOf" srcId="{501DD77C-3B0E-48AD-8F61-E6028996B302}" destId="{9B02CB2B-A4FB-449E-ADE1-3F1C33754127}" srcOrd="0" destOrd="0" presId="urn:microsoft.com/office/officeart/2008/layout/AlternatingHexagons"/>
-    <dgm:cxn modelId="{938C4E04-575B-4D0F-AADA-1C2D572CC094}" srcId="{B86C64F4-4039-4D85-94C4-05075ECA0B40}" destId="{3DA76829-F80F-4F45-97FF-F50E9FE306A0}" srcOrd="0" destOrd="0" parTransId="{F721DC08-C5F7-47A2-881F-DE3A1271AF99}" sibTransId="{E0B04139-BDB9-4CF7-9EF1-844341E1BD6D}"/>
     <dgm:cxn modelId="{CFC80934-1D68-456C-BF56-3884A7C1886D}" type="presOf" srcId="{B86C64F4-4039-4D85-94C4-05075ECA0B40}" destId="{297A4D46-03BF-463F-9766-C3120AF8DD1C}" srcOrd="0" destOrd="0" presId="urn:microsoft.com/office/officeart/2008/layout/AlternatingHexagons"/>
     <dgm:cxn modelId="{9C24FEC0-9607-4175-BF8F-B5C24D122AF7}" type="presParOf" srcId="{5B6A012B-027A-42B3-9183-AE7345BE1DF3}" destId="{59328354-52B7-491B-A323-4CFF118C8FD2}" srcOrd="0" destOrd="0" presId="urn:microsoft.com/office/officeart/2008/layout/AlternatingHexagons"/>
     <dgm:cxn modelId="{DB54A6DC-1B69-4FF9-B408-A78A6609BEF9}" type="presParOf" srcId="{59328354-52B7-491B-A323-4CFF118C8FD2}" destId="{C3430BD1-EA04-4388-9A49-E84CF5C9C757}" srcOrd="0" destOrd="0" presId="urn:microsoft.com/office/officeart/2008/layout/AlternatingHexagons"/>
@@ -6173,15 +6077,15 @@
     </dgm:pt>
   </dgm:ptLst>
   <dgm:cxnLst>
-    <dgm:cxn modelId="{8C6FBB56-70B4-4D27-8A0E-3622FF212534}" srcId="{9DBBB7CF-59B6-4A7A-B5F4-439496211B35}" destId="{8605FAEB-251C-4ADC-9D16-0069E4813335}" srcOrd="1" destOrd="0" parTransId="{441A7EF4-E090-4F2B-AB44-B9C15AA79EB5}" sibTransId="{F73B09DD-B7C7-43FF-BE06-524F98609D7D}"/>
+    <dgm:cxn modelId="{3A030A99-6DB4-4320-A75D-5C22E8A15585}" type="presOf" srcId="{8605FAEB-251C-4ADC-9D16-0069E4813335}" destId="{5669B5FE-10B9-4C65-8E68-9B5009DFEB1A}" srcOrd="0" destOrd="0" presId="urn:microsoft.com/office/officeart/2005/8/layout/chevron2"/>
     <dgm:cxn modelId="{279CE7A7-E9EB-45DA-9143-6ECADC37F1B2}" type="presOf" srcId="{B044072B-CBB2-4C4F-931C-EA24A4F632FB}" destId="{EE968FC7-240F-40A9-A0DB-39D018EE3BBB}" srcOrd="0" destOrd="0" presId="urn:microsoft.com/office/officeart/2005/8/layout/chevron2"/>
     <dgm:cxn modelId="{4F32DF22-6C73-4CB8-B3BE-A1521074B752}" srcId="{9DBBB7CF-59B6-4A7A-B5F4-439496211B35}" destId="{545B1AC2-6887-48ED-871B-49976035611E}" srcOrd="0" destOrd="0" parTransId="{2DDE18F8-B809-4191-82ED-882BD9DB7707}" sibTransId="{5D7A8D9B-9318-491D-81E6-6DB94FA11F78}"/>
-    <dgm:cxn modelId="{FBA2838B-F80B-4B22-8BD3-D92C59E95BA5}" type="presOf" srcId="{9DBBB7CF-59B6-4A7A-B5F4-439496211B35}" destId="{9E2B69AC-73AA-4EC9-920A-C559BAE75FA6}" srcOrd="0" destOrd="0" presId="urn:microsoft.com/office/officeart/2005/8/layout/chevron2"/>
+    <dgm:cxn modelId="{0658016F-5E6C-44AD-94C3-8FAB38CE0913}" type="presOf" srcId="{69C85290-EDA3-4B23-9A6B-F8AD4F5AAD34}" destId="{3B290973-D7D0-4B3A-9492-989CACF31716}" srcOrd="0" destOrd="0" presId="urn:microsoft.com/office/officeart/2005/8/layout/chevron2"/>
     <dgm:cxn modelId="{96E89D7E-9268-4D6E-AF98-1ACE6D393782}" srcId="{8605FAEB-251C-4ADC-9D16-0069E4813335}" destId="{B044072B-CBB2-4C4F-931C-EA24A4F632FB}" srcOrd="0" destOrd="0" parTransId="{E9CAD36D-8A9F-457C-B627-F742DBA85BFB}" sibTransId="{13BB1148-B425-4404-A06A-919308CFB9CB}"/>
-    <dgm:cxn modelId="{3A030A99-6DB4-4320-A75D-5C22E8A15585}" type="presOf" srcId="{8605FAEB-251C-4ADC-9D16-0069E4813335}" destId="{5669B5FE-10B9-4C65-8E68-9B5009DFEB1A}" srcOrd="0" destOrd="0" presId="urn:microsoft.com/office/officeart/2005/8/layout/chevron2"/>
     <dgm:cxn modelId="{08D2AA31-6C00-468B-B762-707FD12A3D06}" type="presOf" srcId="{545B1AC2-6887-48ED-871B-49976035611E}" destId="{D55AD1E9-2B1D-405B-9B8D-9EE3C4907A53}" srcOrd="0" destOrd="0" presId="urn:microsoft.com/office/officeart/2005/8/layout/chevron2"/>
     <dgm:cxn modelId="{AF0DEA7F-F9B2-4D59-BB92-7D10241A42ED}" srcId="{545B1AC2-6887-48ED-871B-49976035611E}" destId="{69C85290-EDA3-4B23-9A6B-F8AD4F5AAD34}" srcOrd="0" destOrd="0" parTransId="{88C5B7B3-8892-4D7A-94D0-F3827D9C58D7}" sibTransId="{472D17B6-2BA1-40D5-9924-BD0C09730170}"/>
-    <dgm:cxn modelId="{0658016F-5E6C-44AD-94C3-8FAB38CE0913}" type="presOf" srcId="{69C85290-EDA3-4B23-9A6B-F8AD4F5AAD34}" destId="{3B290973-D7D0-4B3A-9492-989CACF31716}" srcOrd="0" destOrd="0" presId="urn:microsoft.com/office/officeart/2005/8/layout/chevron2"/>
+    <dgm:cxn modelId="{8C6FBB56-70B4-4D27-8A0E-3622FF212534}" srcId="{9DBBB7CF-59B6-4A7A-B5F4-439496211B35}" destId="{8605FAEB-251C-4ADC-9D16-0069E4813335}" srcOrd="1" destOrd="0" parTransId="{441A7EF4-E090-4F2B-AB44-B9C15AA79EB5}" sibTransId="{F73B09DD-B7C7-43FF-BE06-524F98609D7D}"/>
+    <dgm:cxn modelId="{FBA2838B-F80B-4B22-8BD3-D92C59E95BA5}" type="presOf" srcId="{9DBBB7CF-59B6-4A7A-B5F4-439496211B35}" destId="{9E2B69AC-73AA-4EC9-920A-C559BAE75FA6}" srcOrd="0" destOrd="0" presId="urn:microsoft.com/office/officeart/2005/8/layout/chevron2"/>
     <dgm:cxn modelId="{82ECB3E2-2B0B-4AC1-8C65-B7849C861499}" type="presParOf" srcId="{9E2B69AC-73AA-4EC9-920A-C559BAE75FA6}" destId="{DFBA4E65-0943-48BA-8C31-78F0FF9287F8}" srcOrd="0" destOrd="0" presId="urn:microsoft.com/office/officeart/2005/8/layout/chevron2"/>
     <dgm:cxn modelId="{6F58D839-1854-4DCD-83EC-51A892D77FD6}" type="presParOf" srcId="{DFBA4E65-0943-48BA-8C31-78F0FF9287F8}" destId="{D55AD1E9-2B1D-405B-9B8D-9EE3C4907A53}" srcOrd="0" destOrd="0" presId="urn:microsoft.com/office/officeart/2005/8/layout/chevron2"/>
     <dgm:cxn modelId="{638CE5B1-E67E-4D93-9899-0BD7CFA7C5FC}" type="presParOf" srcId="{DFBA4E65-0943-48BA-8C31-78F0FF9287F8}" destId="{3B290973-D7D0-4B3A-9492-989CACF31716}" srcOrd="1" destOrd="0" presId="urn:microsoft.com/office/officeart/2005/8/layout/chevron2"/>
@@ -7498,31 +7402,6 @@
         </a:effectRef>
         <a:fontRef idx="minor"/>
       </dsp:style>
-      <dsp:txBody>
-        <a:bodyPr spcFirstLastPara="0" vert="horz" wrap="square" lIns="60960" tIns="60960" rIns="60960" bIns="60960" numCol="1" spcCol="1270" anchor="ctr" anchorCtr="0">
-          <a:noAutofit/>
-        </a:bodyPr>
-        <a:lstStyle/>
-        <a:p>
-          <a:pPr marL="0" lvl="0" indent="0" algn="l" defTabSz="711200">
-            <a:lnSpc>
-              <a:spcPct val="90000"/>
-            </a:lnSpc>
-            <a:spcBef>
-              <a:spcPct val="0"/>
-            </a:spcBef>
-            <a:spcAft>
-              <a:spcPct val="35000"/>
-            </a:spcAft>
-            <a:buNone/>
-          </a:pPr>
-          <a:endParaRPr lang="en-US" sz="1600" kern="1200" dirty="0"/>
-        </a:p>
-      </dsp:txBody>
-      <dsp:txXfrm>
-        <a:off x="5437901" y="401821"/>
-        <a:ext cx="2241629" cy="1205177"/>
-      </dsp:txXfrm>
     </dsp:sp>
     <dsp:sp modelId="{1BB9E6BE-18A3-479B-A740-B7E580DDE8CA}">
       <dsp:nvSpPr>
@@ -7807,31 +7686,6 @@
         </a:effectRef>
         <a:fontRef idx="minor"/>
       </dsp:style>
-      <dsp:txBody>
-        <a:bodyPr spcFirstLastPara="0" vert="horz" wrap="square" lIns="60960" tIns="60960" rIns="60960" bIns="60960" numCol="1" spcCol="1270" anchor="ctr" anchorCtr="0">
-          <a:noAutofit/>
-        </a:bodyPr>
-        <a:lstStyle/>
-        <a:p>
-          <a:pPr marL="0" lvl="0" indent="0" algn="r" defTabSz="711200">
-            <a:lnSpc>
-              <a:spcPct val="90000"/>
-            </a:lnSpc>
-            <a:spcBef>
-              <a:spcPct val="0"/>
-            </a:spcBef>
-            <a:spcAft>
-              <a:spcPct val="35000"/>
-            </a:spcAft>
-            <a:buNone/>
-          </a:pPr>
-          <a:endParaRPr lang="en-US" sz="1600" kern="1200"/>
-        </a:p>
-      </dsp:txBody>
-      <dsp:txXfrm>
-        <a:off x="448468" y="2106744"/>
-        <a:ext cx="2169318" cy="1205177"/>
-      </dsp:txXfrm>
     </dsp:sp>
     <dsp:sp modelId="{2D105EDE-8F4D-4159-B583-221AA1BD9DAA}">
       <dsp:nvSpPr>
@@ -8116,31 +7970,6 @@
         </a:effectRef>
         <a:fontRef idx="minor"/>
       </dsp:style>
-      <dsp:txBody>
-        <a:bodyPr spcFirstLastPara="0" vert="horz" wrap="square" lIns="60960" tIns="60960" rIns="60960" bIns="60960" numCol="1" spcCol="1270" anchor="ctr" anchorCtr="0">
-          <a:noAutofit/>
-        </a:bodyPr>
-        <a:lstStyle/>
-        <a:p>
-          <a:pPr marL="0" lvl="0" indent="0" algn="l" defTabSz="711200">
-            <a:lnSpc>
-              <a:spcPct val="90000"/>
-            </a:lnSpc>
-            <a:spcBef>
-              <a:spcPct val="0"/>
-            </a:spcBef>
-            <a:spcAft>
-              <a:spcPct val="35000"/>
-            </a:spcAft>
-            <a:buNone/>
-          </a:pPr>
-          <a:endParaRPr lang="en-US" sz="1600" kern="1200"/>
-        </a:p>
-      </dsp:txBody>
-      <dsp:txXfrm>
-        <a:off x="5437901" y="3811668"/>
-        <a:ext cx="2241629" cy="1205177"/>
-      </dsp:txXfrm>
     </dsp:sp>
     <dsp:sp modelId="{9B02CB2B-A4FB-449E-ADE1-3F1C33754127}">
       <dsp:nvSpPr>
@@ -19383,7 +19212,7 @@
                 <a:tabLst/>
                 <a:defRPr/>
               </a:pPr>
-              <a:t>4/29/2019 10:37 PM</a:t>
+              <a:t>4/29/2019 11:29 PM</a:t>
             </a:fld>
             <a:endParaRPr kumimoji="0" lang="en-US" sz="1800" b="0" i="0" u="none" strike="noStrike" kern="0" cap="none" spc="0" normalizeH="0" baseline="0" noProof="0" dirty="0">
               <a:ln>
@@ -19564,6 +19393,119 @@
     <p:extLst>
       <p:ext uri="{BB962C8B-B14F-4D97-AF65-F5344CB8AC3E}">
         <p14:creationId xmlns:p14="http://schemas.microsoft.com/office/powerpoint/2010/main" val="3919951938"/>
+      </p:ext>
+    </p:extLst>
+  </p:cSld>
+  <p:clrMapOvr>
+    <a:masterClrMapping/>
+  </p:clrMapOvr>
+</p:notes>
+</file>
+
+<file path=ppt/notesSlides/notesSlide5.xml><?xml version="1.0" encoding="utf-8"?>
+<p:notes xmlns:a="http://schemas.openxmlformats.org/drawingml/2006/main" xmlns:r="http://schemas.openxmlformats.org/officeDocument/2006/relationships" xmlns:p="http://schemas.openxmlformats.org/presentationml/2006/main">
+  <p:cSld>
+    <p:spTree>
+      <p:nvGrpSpPr>
+        <p:cNvPr id="1" name=""/>
+        <p:cNvGrpSpPr/>
+        <p:nvPr/>
+      </p:nvGrpSpPr>
+      <p:grpSpPr>
+        <a:xfrm>
+          <a:off x="0" y="0"/>
+          <a:ext cx="0" cy="0"/>
+          <a:chOff x="0" y="0"/>
+          <a:chExt cx="0" cy="0"/>
+        </a:xfrm>
+      </p:grpSpPr>
+      <p:sp>
+        <p:nvSpPr>
+          <p:cNvPr id="2" name="Slide Image Placeholder 1"/>
+          <p:cNvSpPr>
+            <a:spLocks noGrp="1" noRot="1" noChangeAspect="1"/>
+          </p:cNvSpPr>
+          <p:nvPr>
+            <p:ph type="sldImg"/>
+          </p:nvPr>
+        </p:nvSpPr>
+        <p:spPr/>
+      </p:sp>
+      <p:sp>
+        <p:nvSpPr>
+          <p:cNvPr id="3" name="Notes Placeholder 2"/>
+          <p:cNvSpPr>
+            <a:spLocks noGrp="1"/>
+          </p:cNvSpPr>
+          <p:nvPr>
+            <p:ph type="body" idx="1"/>
+          </p:nvPr>
+        </p:nvSpPr>
+        <p:spPr/>
+        <p:txBody>
+          <a:bodyPr/>
+          <a:lstStyle/>
+          <a:p>
+            <a:r>
+              <a:rPr lang="en-US" dirty="0"/>
+              <a:t>To use this title animation slide with a new image simply 1) move the top semi-transparent shape</a:t>
+            </a:r>
+            <a:r>
+              <a:rPr lang="en-US" baseline="0" dirty="0"/>
+              <a:t> </a:t>
+            </a:r>
+            <a:r>
+              <a:rPr lang="en-US" dirty="0"/>
+              <a:t>to the side, 2) delete placeholder image,</a:t>
+            </a:r>
+            <a:r>
+              <a:rPr lang="en-US" baseline="0" dirty="0"/>
+              <a:t> </a:t>
+            </a:r>
+            <a:br>
+              <a:rPr lang="en-US" baseline="0" dirty="0"/>
+            </a:br>
+            <a:r>
+              <a:rPr lang="en-US" baseline="0" dirty="0"/>
+              <a:t>3) click on the picture icon to add a new picture, 4) </a:t>
+            </a:r>
+            <a:r>
+              <a:rPr lang="en-US" dirty="0"/>
+              <a:t>Move semi-transparent shape back to original position, 5) Update text on slide.</a:t>
+            </a:r>
+          </a:p>
+          <a:p>
+            <a:endParaRPr lang="en-US" dirty="0"/>
+          </a:p>
+        </p:txBody>
+      </p:sp>
+      <p:sp>
+        <p:nvSpPr>
+          <p:cNvPr id="4" name="Slide Number Placeholder 3"/>
+          <p:cNvSpPr>
+            <a:spLocks noGrp="1"/>
+          </p:cNvSpPr>
+          <p:nvPr>
+            <p:ph type="sldNum" sz="quarter" idx="10"/>
+          </p:nvPr>
+        </p:nvSpPr>
+        <p:spPr/>
+        <p:txBody>
+          <a:bodyPr/>
+          <a:lstStyle/>
+          <a:p>
+            <a:fld id="{4CBCEA92-F142-4D57-B507-37BDAF44710C}" type="slidenum">
+              <a:rPr lang="en-US" smtClean="0"/>
+              <a:t>22</a:t>
+            </a:fld>
+            <a:endParaRPr lang="en-US"/>
+          </a:p>
+        </p:txBody>
+      </p:sp>
+    </p:spTree>
+    <p:extLst>
+      <p:ext uri="{BB962C8B-B14F-4D97-AF65-F5344CB8AC3E}">
+        <p14:creationId xmlns:p14="http://schemas.microsoft.com/office/powerpoint/2010/main" val="2450132159"/>
       </p:ext>
     </p:extLst>
   </p:cSld>
@@ -40398,12 +40340,27 @@
         <p:spPr>
           <a:xfrm>
             <a:off x="221771" y="1788114"/>
-            <a:ext cx="6124943" cy="1420679"/>
+            <a:ext cx="6124943" cy="4376583"/>
           </a:xfrm>
         </p:spPr>
         <p:txBody>
           <a:bodyPr/>
           <a:lstStyle/>
+          <a:p>
+            <a:pPr algn="l"/>
+            <a:r>
+              <a:rPr lang="en-IN" sz="1800" dirty="0"/>
+              <a:t>The </a:t>
+            </a:r>
+            <a:r>
+              <a:rPr lang="en-IN" sz="1800" b="1" dirty="0"/>
+              <a:t>watcher</a:t>
+            </a:r>
+            <a:r>
+              <a:rPr lang="en-IN" sz="1800" dirty="0"/>
+              <a:t> is a fully convolutional network (FCN) encoder. </a:t>
+            </a:r>
+          </a:p>
           <a:p>
             <a:pPr algn="l"/>
             <a:r>
@@ -40541,6 +40498,9 @@
   <p:clrMapOvr>
     <a:masterClrMapping/>
   </p:clrMapOvr>
+  <p:transition spd="slow">
+    <p:cover/>
+  </p:transition>
 </p:sld>
 </file>
 
@@ -40793,7 +40753,7 @@
     <a:masterClrMapping/>
   </p:clrMapOvr>
   <p:transition spd="slow">
-    <p:push/>
+    <p:push dir="u"/>
   </p:transition>
 </p:sld>
 </file>
@@ -40972,6 +40932,9 @@
   <p:clrMapOvr>
     <a:masterClrMapping/>
   </p:clrMapOvr>
+  <p:transition spd="med">
+    <p:pull/>
+  </p:transition>
 </p:sld>
 </file>
 
@@ -41359,6 +41322,9 @@
   <p:clrMapOvr>
     <a:masterClrMapping/>
   </p:clrMapOvr>
+  <p:transition spd="slow">
+    <p:push dir="u"/>
+  </p:transition>
 </p:sld>
 </file>
 
@@ -41571,6 +41537,9 @@
   <p:clrMapOvr>
     <a:masterClrMapping/>
   </p:clrMapOvr>
+  <p:transition spd="med">
+    <p:pull/>
+  </p:transition>
 </p:sld>
 </file>
 
@@ -41759,6 +41728,9 @@
   <p:clrMapOvr>
     <a:masterClrMapping/>
   </p:clrMapOvr>
+  <p:transition spd="med">
+    <p:pull/>
+  </p:transition>
 </p:sld>
 </file>
 
@@ -41993,10 +41965,362 @@
   <p:clrMapOvr>
     <a:masterClrMapping/>
   </p:clrMapOvr>
+  <p:transition spd="med">
+    <p:pull/>
+  </p:transition>
 </p:sld>
 </file>
 
 <file path=ppt/slides/slide17.xml><?xml version="1.0" encoding="utf-8"?>
+<p:sld xmlns:a="http://schemas.openxmlformats.org/drawingml/2006/main" xmlns:r="http://schemas.openxmlformats.org/officeDocument/2006/relationships" xmlns:p="http://schemas.openxmlformats.org/presentationml/2006/main">
+  <p:cSld>
+    <p:spTree>
+      <p:nvGrpSpPr>
+        <p:cNvPr id="1" name=""/>
+        <p:cNvGrpSpPr/>
+        <p:nvPr/>
+      </p:nvGrpSpPr>
+      <p:grpSpPr>
+        <a:xfrm>
+          <a:off x="0" y="0"/>
+          <a:ext cx="0" cy="0"/>
+          <a:chOff x="0" y="0"/>
+          <a:chExt cx="0" cy="0"/>
+        </a:xfrm>
+      </p:grpSpPr>
+      <p:sp>
+        <p:nvSpPr>
+          <p:cNvPr id="3" name="Text Placeholder 2"/>
+          <p:cNvSpPr>
+            <a:spLocks noGrp="1"/>
+          </p:cNvSpPr>
+          <p:nvPr>
+            <p:ph type="body" sz="quarter" idx="11"/>
+          </p:nvPr>
+        </p:nvSpPr>
+        <p:spPr>
+          <a:xfrm>
+            <a:off x="5888648" y="1978270"/>
+            <a:ext cx="6097555" cy="3240887"/>
+          </a:xfrm>
+        </p:spPr>
+        <p:txBody>
+          <a:bodyPr/>
+          <a:lstStyle/>
+          <a:p>
+            <a:pPr marL="285750" indent="-285750" algn="l">
+              <a:buFont typeface="Arial" panose="020B0604020202020204" pitchFamily="34" charset="0"/>
+              <a:buChar char="•"/>
+            </a:pPr>
+            <a:r>
+              <a:rPr lang="en-IN" sz="1600" dirty="0"/>
+              <a:t>This model deals with the problems caused by pooling operations. </a:t>
+            </a:r>
+          </a:p>
+          <a:p>
+            <a:pPr marL="285750" indent="-285750" algn="l">
+              <a:buFont typeface="Arial" panose="020B0604020202020204" pitchFamily="34" charset="0"/>
+              <a:buChar char="•"/>
+            </a:pPr>
+            <a:r>
+              <a:rPr lang="en-IN" sz="1600" dirty="0"/>
+              <a:t>Because the scales of handwritten math symbols vary severely, the fine-grained details of extracted feature maps  are lost in low-resolution feature maps.</a:t>
+            </a:r>
+          </a:p>
+          <a:p>
+            <a:pPr marL="285750" indent="-285750" algn="l">
+              <a:buFont typeface="Arial" panose="020B0604020202020204" pitchFamily="34" charset="0"/>
+              <a:buChar char="•"/>
+            </a:pPr>
+            <a:r>
+              <a:rPr lang="en-IN" sz="1600" dirty="0"/>
+              <a:t> After many pooling layers, the visual information of the decimal point is gone, which leads to an under-parsing problem.</a:t>
+            </a:r>
+          </a:p>
+          <a:p>
+            <a:pPr algn="l"/>
+            <a:r>
+              <a:rPr lang="en-IN" sz="1600" dirty="0"/>
+              <a:t> </a:t>
+            </a:r>
+          </a:p>
+        </p:txBody>
+      </p:sp>
+      <p:sp>
+        <p:nvSpPr>
+          <p:cNvPr id="4" name="Text Placeholder 3"/>
+          <p:cNvSpPr>
+            <a:spLocks noGrp="1"/>
+          </p:cNvSpPr>
+          <p:nvPr>
+            <p:ph type="body" sz="quarter" idx="19"/>
+          </p:nvPr>
+        </p:nvSpPr>
+        <p:spPr>
+          <a:xfrm>
+            <a:off x="6094444" y="384786"/>
+            <a:ext cx="6097556" cy="1089529"/>
+          </a:xfrm>
+        </p:spPr>
+        <p:txBody>
+          <a:bodyPr/>
+          <a:lstStyle/>
+          <a:p>
+            <a:r>
+              <a:rPr lang="en-IN" b="1" dirty="0"/>
+              <a:t>MULTI SCALE ATTENTION WITH DENSE ENCODER</a:t>
+            </a:r>
+          </a:p>
+        </p:txBody>
+      </p:sp>
+      <p:sp>
+        <p:nvSpPr>
+          <p:cNvPr id="6" name="Slide Number Placeholder 5"/>
+          <p:cNvSpPr>
+            <a:spLocks noGrp="1"/>
+          </p:cNvSpPr>
+          <p:nvPr>
+            <p:ph type="sldNum" sz="quarter" idx="4"/>
+          </p:nvPr>
+        </p:nvSpPr>
+        <p:spPr/>
+        <p:txBody>
+          <a:bodyPr/>
+          <a:lstStyle/>
+          <a:p>
+            <a:fld id="{4997E989-D798-4C62-8E93-3D2D613C2488}" type="slidenum">
+              <a:rPr lang="en-US" smtClean="0"/>
+              <a:pPr/>
+              <a:t>17</a:t>
+            </a:fld>
+            <a:endParaRPr lang="en-US"/>
+          </a:p>
+        </p:txBody>
+      </p:sp>
+      <p:pic>
+        <p:nvPicPr>
+          <p:cNvPr id="7" name="Picture 6"/>
+          <p:cNvPicPr>
+            <a:picLocks noChangeAspect="1"/>
+          </p:cNvPicPr>
+          <p:nvPr/>
+        </p:nvPicPr>
+        <p:blipFill>
+          <a:blip r:embed="rId2"/>
+          <a:stretch>
+            <a:fillRect/>
+          </a:stretch>
+        </p:blipFill>
+        <p:spPr>
+          <a:xfrm>
+            <a:off x="78398" y="1474315"/>
+            <a:ext cx="5810250" cy="2533650"/>
+          </a:xfrm>
+          <a:prstGeom prst="rect">
+            <a:avLst/>
+          </a:prstGeom>
+        </p:spPr>
+      </p:pic>
+    </p:spTree>
+    <p:extLst>
+      <p:ext uri="{BB962C8B-B14F-4D97-AF65-F5344CB8AC3E}">
+        <p14:creationId xmlns:p14="http://schemas.microsoft.com/office/powerpoint/2010/main" val="169297433"/>
+      </p:ext>
+    </p:extLst>
+  </p:cSld>
+  <p:clrMapOvr>
+    <a:masterClrMapping/>
+  </p:clrMapOvr>
+  <p:transition spd="slow">
+    <p:push dir="u"/>
+  </p:transition>
+</p:sld>
+</file>
+
+<file path=ppt/slides/slide18.xml><?xml version="1.0" encoding="utf-8"?>
+<p:sld xmlns:a="http://schemas.openxmlformats.org/drawingml/2006/main" xmlns:r="http://schemas.openxmlformats.org/officeDocument/2006/relationships" xmlns:p="http://schemas.openxmlformats.org/presentationml/2006/main">
+  <p:cSld>
+    <p:spTree>
+      <p:nvGrpSpPr>
+        <p:cNvPr id="1" name=""/>
+        <p:cNvGrpSpPr/>
+        <p:nvPr/>
+      </p:nvGrpSpPr>
+      <p:grpSpPr>
+        <a:xfrm>
+          <a:off x="0" y="0"/>
+          <a:ext cx="0" cy="0"/>
+          <a:chOff x="0" y="0"/>
+          <a:chExt cx="0" cy="0"/>
+        </a:xfrm>
+      </p:grpSpPr>
+      <p:sp>
+        <p:nvSpPr>
+          <p:cNvPr id="3" name="Text Placeholder 2"/>
+          <p:cNvSpPr>
+            <a:spLocks noGrp="1"/>
+          </p:cNvSpPr>
+          <p:nvPr>
+            <p:ph type="body" sz="quarter" idx="11"/>
+          </p:nvPr>
+        </p:nvSpPr>
+        <p:spPr>
+          <a:xfrm>
+            <a:off x="5888648" y="1978270"/>
+            <a:ext cx="6097555" cy="3847207"/>
+          </a:xfrm>
+        </p:spPr>
+        <p:txBody>
+          <a:bodyPr/>
+          <a:lstStyle/>
+          <a:p>
+            <a:pPr marL="285750" indent="-285750" algn="l">
+              <a:buFont typeface="Arial" panose="020B0604020202020204" pitchFamily="34" charset="0"/>
+              <a:buChar char="•"/>
+            </a:pPr>
+            <a:r>
+              <a:rPr lang="en-IN" sz="1600" dirty="0"/>
+              <a:t>To implement the multi-scale attention model, a multi-scale dense encoder is used that will provide both low-resolution features and high-resolution features.</a:t>
+            </a:r>
+          </a:p>
+          <a:p>
+            <a:pPr marL="285750" indent="-285750" algn="l">
+              <a:buFont typeface="Arial" panose="020B0604020202020204" pitchFamily="34" charset="0"/>
+              <a:buChar char="•"/>
+            </a:pPr>
+            <a:r>
+              <a:rPr lang="en-IN" sz="1600" dirty="0"/>
+              <a:t>The low-resolution features capture a </a:t>
+            </a:r>
+            <a:r>
+              <a:rPr lang="en-IN" sz="1600" b="1" dirty="0"/>
+              <a:t>larger receptive field </a:t>
+            </a:r>
+            <a:r>
+              <a:rPr lang="en-IN" sz="1600" dirty="0"/>
+              <a:t>and are more semantic while the high-resolution features restore more fine-grained visual information. </a:t>
+            </a:r>
+          </a:p>
+          <a:p>
+            <a:pPr marL="285750" indent="-285750" algn="l">
+              <a:buFont typeface="Arial" panose="020B0604020202020204" pitchFamily="34" charset="0"/>
+              <a:buChar char="•"/>
+            </a:pPr>
+            <a:r>
+              <a:rPr lang="en-IN" sz="1600" dirty="0"/>
+              <a:t>The decoder then attends to both low-resolution and high-resolution features for predicting output </a:t>
+            </a:r>
+            <a:r>
+              <a:rPr lang="en-IN" sz="1600" dirty="0" err="1"/>
+              <a:t>LaTeX</a:t>
+            </a:r>
+            <a:r>
+              <a:rPr lang="en-IN" sz="1600" dirty="0"/>
+              <a:t> strings.</a:t>
+            </a:r>
+          </a:p>
+          <a:p>
+            <a:pPr algn="l"/>
+            <a:endParaRPr lang="en-IN" sz="1600" dirty="0"/>
+          </a:p>
+          <a:p>
+            <a:pPr algn="l"/>
+            <a:endParaRPr lang="en-IN" sz="1600" dirty="0"/>
+          </a:p>
+        </p:txBody>
+      </p:sp>
+      <p:sp>
+        <p:nvSpPr>
+          <p:cNvPr id="4" name="Text Placeholder 3"/>
+          <p:cNvSpPr>
+            <a:spLocks noGrp="1"/>
+          </p:cNvSpPr>
+          <p:nvPr>
+            <p:ph type="body" sz="quarter" idx="19"/>
+          </p:nvPr>
+        </p:nvSpPr>
+        <p:spPr>
+          <a:xfrm>
+            <a:off x="6094444" y="384786"/>
+            <a:ext cx="6097556" cy="1089529"/>
+          </a:xfrm>
+        </p:spPr>
+        <p:txBody>
+          <a:bodyPr/>
+          <a:lstStyle/>
+          <a:p>
+            <a:r>
+              <a:rPr lang="en-IN" b="1" dirty="0"/>
+              <a:t>MULTI SCALE ATTENTION WITH DENSE ENCODER</a:t>
+            </a:r>
+          </a:p>
+        </p:txBody>
+      </p:sp>
+      <p:sp>
+        <p:nvSpPr>
+          <p:cNvPr id="6" name="Slide Number Placeholder 5"/>
+          <p:cNvSpPr>
+            <a:spLocks noGrp="1"/>
+          </p:cNvSpPr>
+          <p:nvPr>
+            <p:ph type="sldNum" sz="quarter" idx="4"/>
+          </p:nvPr>
+        </p:nvSpPr>
+        <p:spPr/>
+        <p:txBody>
+          <a:bodyPr/>
+          <a:lstStyle/>
+          <a:p>
+            <a:fld id="{4997E989-D798-4C62-8E93-3D2D613C2488}" type="slidenum">
+              <a:rPr lang="en-US" smtClean="0"/>
+              <a:pPr/>
+              <a:t>18</a:t>
+            </a:fld>
+            <a:endParaRPr lang="en-US"/>
+          </a:p>
+        </p:txBody>
+      </p:sp>
+      <p:pic>
+        <p:nvPicPr>
+          <p:cNvPr id="8" name="Picture 7"/>
+          <p:cNvPicPr>
+            <a:picLocks noChangeAspect="1"/>
+          </p:cNvPicPr>
+          <p:nvPr/>
+        </p:nvPicPr>
+        <p:blipFill>
+          <a:blip r:embed="rId2"/>
+          <a:stretch>
+            <a:fillRect/>
+          </a:stretch>
+        </p:blipFill>
+        <p:spPr>
+          <a:xfrm>
+            <a:off x="0" y="203687"/>
+            <a:ext cx="5811982" cy="6534150"/>
+          </a:xfrm>
+          <a:prstGeom prst="rect">
+            <a:avLst/>
+          </a:prstGeom>
+        </p:spPr>
+      </p:pic>
+    </p:spTree>
+    <p:extLst>
+      <p:ext uri="{BB962C8B-B14F-4D97-AF65-F5344CB8AC3E}">
+        <p14:creationId xmlns:p14="http://schemas.microsoft.com/office/powerpoint/2010/main" val="2301854536"/>
+      </p:ext>
+    </p:extLst>
+  </p:cSld>
+  <p:clrMapOvr>
+    <a:masterClrMapping/>
+  </p:clrMapOvr>
+  <p:transition spd="med">
+    <p:pull/>
+  </p:transition>
+</p:sld>
+</file>
+
+<file path=ppt/slides/slide19.xml><?xml version="1.0" encoding="utf-8"?>
 <p:sld xmlns:a="http://schemas.openxmlformats.org/drawingml/2006/main" xmlns:r="http://schemas.openxmlformats.org/officeDocument/2006/relationships" xmlns:p="http://schemas.openxmlformats.org/presentationml/2006/main">
   <p:cSld>
     <p:spTree>
@@ -42047,7 +42371,7 @@
           <p:nvPr>
             <p:extLst>
               <p:ext uri="{D42A27DB-BD31-4B8C-83A1-F6EECF244321}">
-                <p14:modId xmlns:p14="http://schemas.microsoft.com/office/powerpoint/2010/main" val="1717066689"/>
+                <p14:modId xmlns:p14="http://schemas.microsoft.com/office/powerpoint/2010/main" val="3283734037"/>
               </p:ext>
             </p:extLst>
           </p:nvPr>
@@ -42072,307 +42396,9 @@
   <p:clrMapOvr>
     <a:masterClrMapping/>
   </p:clrMapOvr>
-</p:sld>
-</file>
-
-<file path=ppt/slides/slide18.xml><?xml version="1.0" encoding="utf-8"?>
-<p:sld xmlns:a="http://schemas.openxmlformats.org/drawingml/2006/main" xmlns:r="http://schemas.openxmlformats.org/officeDocument/2006/relationships" xmlns:p="http://schemas.openxmlformats.org/presentationml/2006/main">
-  <p:cSld>
-    <p:spTree>
-      <p:nvGrpSpPr>
-        <p:cNvPr id="1" name=""/>
-        <p:cNvGrpSpPr/>
-        <p:nvPr/>
-      </p:nvGrpSpPr>
-      <p:grpSpPr>
-        <a:xfrm>
-          <a:off x="0" y="0"/>
-          <a:ext cx="0" cy="0"/>
-          <a:chOff x="0" y="0"/>
-          <a:chExt cx="0" cy="0"/>
-        </a:xfrm>
-      </p:grpSpPr>
-      <p:sp>
-        <p:nvSpPr>
-          <p:cNvPr id="3" name="Text Placeholder 2"/>
-          <p:cNvSpPr>
-            <a:spLocks noGrp="1"/>
-          </p:cNvSpPr>
-          <p:nvPr>
-            <p:ph type="body" sz="quarter" idx="10"/>
-          </p:nvPr>
-        </p:nvSpPr>
-        <p:spPr>
-          <a:xfrm>
-            <a:off x="3875454" y="449830"/>
-            <a:ext cx="4376615" cy="646331"/>
-          </a:xfrm>
-        </p:spPr>
-        <p:txBody>
-          <a:bodyPr/>
-          <a:lstStyle/>
-          <a:p>
-            <a:r>
-              <a:rPr lang="en-IN" sz="4000" dirty="0"/>
-              <a:t>Evaluation</a:t>
-            </a:r>
-          </a:p>
-        </p:txBody>
-      </p:sp>
-      <p:sp>
-        <p:nvSpPr>
-          <p:cNvPr id="4" name="Text Placeholder 3"/>
-          <p:cNvSpPr>
-            <a:spLocks noGrp="1"/>
-          </p:cNvSpPr>
-          <p:nvPr>
-            <p:ph type="body" sz="quarter" idx="11"/>
-          </p:nvPr>
-        </p:nvSpPr>
-        <p:spPr>
-          <a:xfrm>
-            <a:off x="304801" y="4206240"/>
-            <a:ext cx="11658600" cy="424732"/>
-          </a:xfrm>
-        </p:spPr>
-        <p:txBody>
-          <a:bodyPr/>
-          <a:lstStyle/>
-          <a:p>
-            <a:endParaRPr lang="en-IN" dirty="0"/>
-          </a:p>
-        </p:txBody>
-      </p:sp>
-      <p:graphicFrame>
-        <p:nvGraphicFramePr>
-          <p:cNvPr id="6" name="Diagram 5"/>
-          <p:cNvGraphicFramePr/>
-          <p:nvPr>
-            <p:extLst>
-              <p:ext uri="{D42A27DB-BD31-4B8C-83A1-F6EECF244321}">
-                <p14:modId xmlns:p14="http://schemas.microsoft.com/office/powerpoint/2010/main" val="4175732629"/>
-              </p:ext>
-            </p:extLst>
-          </p:nvPr>
-        </p:nvGraphicFramePr>
-        <p:xfrm>
-          <a:off x="115276" y="1433145"/>
-          <a:ext cx="7103208" cy="4990058"/>
-        </p:xfrm>
-        <a:graphic>
-          <a:graphicData uri="http://schemas.openxmlformats.org/drawingml/2006/diagram">
-            <dgm:relIds xmlns:dgm="http://schemas.openxmlformats.org/drawingml/2006/diagram" xmlns:r="http://schemas.openxmlformats.org/officeDocument/2006/relationships" r:dm="rId2" r:lo="rId3" r:qs="rId4" r:cs="rId5"/>
-          </a:graphicData>
-        </a:graphic>
-      </p:graphicFrame>
-      <p:pic>
-        <p:nvPicPr>
-          <p:cNvPr id="7" name="Picture 6"/>
-          <p:cNvPicPr>
-            <a:picLocks noChangeAspect="1"/>
-          </p:cNvPicPr>
-          <p:nvPr/>
-        </p:nvPicPr>
-        <p:blipFill>
-          <a:blip r:embed="rId7"/>
-          <a:stretch>
-            <a:fillRect/>
-          </a:stretch>
-        </p:blipFill>
-        <p:spPr>
-          <a:xfrm>
-            <a:off x="7509730" y="3538904"/>
-            <a:ext cx="4162425" cy="2628900"/>
-          </a:xfrm>
-          <a:prstGeom prst="rect">
-            <a:avLst/>
-          </a:prstGeom>
-        </p:spPr>
-      </p:pic>
-      <p:pic>
-        <p:nvPicPr>
-          <p:cNvPr id="8" name="Picture 7"/>
-          <p:cNvPicPr>
-            <a:picLocks noChangeAspect="1"/>
-          </p:cNvPicPr>
-          <p:nvPr/>
-        </p:nvPicPr>
-        <p:blipFill>
-          <a:blip r:embed="rId8"/>
-          <a:stretch>
-            <a:fillRect/>
-          </a:stretch>
-        </p:blipFill>
-        <p:spPr>
-          <a:xfrm>
-            <a:off x="5833330" y="6275565"/>
-            <a:ext cx="5838825" cy="295275"/>
-          </a:xfrm>
-          <a:prstGeom prst="rect">
-            <a:avLst/>
-          </a:prstGeom>
-        </p:spPr>
-      </p:pic>
-      <p:sp>
-        <p:nvSpPr>
-          <p:cNvPr id="10" name="Right Arrow 9"/>
-          <p:cNvSpPr/>
-          <p:nvPr/>
-        </p:nvSpPr>
-        <p:spPr>
-          <a:xfrm>
-            <a:off x="3578469" y="6167804"/>
-            <a:ext cx="2083776" cy="592383"/>
-          </a:xfrm>
-          <a:prstGeom prst="rightArrow">
-            <a:avLst/>
-          </a:prstGeom>
-        </p:spPr>
-        <p:style>
-          <a:lnRef idx="2">
-            <a:schemeClr val="accent1">
-              <a:shade val="50000"/>
-            </a:schemeClr>
-          </a:lnRef>
-          <a:fillRef idx="1">
-            <a:schemeClr val="accent1"/>
-          </a:fillRef>
-          <a:effectRef idx="0">
-            <a:schemeClr val="accent1"/>
-          </a:effectRef>
-          <a:fontRef idx="minor">
-            <a:schemeClr val="lt1"/>
-          </a:fontRef>
-        </p:style>
-        <p:txBody>
-          <a:bodyPr rtlCol="0" anchor="ctr"/>
-          <a:lstStyle/>
-          <a:p>
-            <a:pPr algn="ctr"/>
-            <a:endParaRPr lang="en-IN" dirty="0"/>
-          </a:p>
-          <a:p>
-            <a:pPr algn="ctr"/>
-            <a:r>
-              <a:rPr lang="en-IN" dirty="0"/>
-              <a:t>Our Best Result:</a:t>
-            </a:r>
-          </a:p>
-          <a:p>
-            <a:pPr algn="ctr"/>
-            <a:endParaRPr lang="en-IN" dirty="0"/>
-          </a:p>
-        </p:txBody>
-      </p:sp>
-    </p:spTree>
-    <p:extLst>
-      <p:ext uri="{BB962C8B-B14F-4D97-AF65-F5344CB8AC3E}">
-        <p14:creationId xmlns:p14="http://schemas.microsoft.com/office/powerpoint/2010/main" val="2413825636"/>
-      </p:ext>
-    </p:extLst>
-  </p:cSld>
-  <p:clrMapOvr>
-    <a:masterClrMapping/>
-  </p:clrMapOvr>
-</p:sld>
-</file>
-
-<file path=ppt/slides/slide19.xml><?xml version="1.0" encoding="utf-8"?>
-<p:sld xmlns:a="http://schemas.openxmlformats.org/drawingml/2006/main" xmlns:r="http://schemas.openxmlformats.org/officeDocument/2006/relationships" xmlns:p="http://schemas.openxmlformats.org/presentationml/2006/main">
-  <p:cSld>
-    <p:spTree>
-      <p:nvGrpSpPr>
-        <p:cNvPr id="1" name=""/>
-        <p:cNvGrpSpPr/>
-        <p:nvPr/>
-      </p:nvGrpSpPr>
-      <p:grpSpPr>
-        <a:xfrm>
-          <a:off x="0" y="0"/>
-          <a:ext cx="0" cy="0"/>
-          <a:chOff x="0" y="0"/>
-          <a:chExt cx="0" cy="0"/>
-        </a:xfrm>
-      </p:grpSpPr>
-      <p:sp>
-        <p:nvSpPr>
-          <p:cNvPr id="4" name="Title 6">
-            <a:extLst>
-              <a:ext uri="{FF2B5EF4-FFF2-40B4-BE49-F238E27FC236}">
-                <a16:creationId xmlns:a16="http://schemas.microsoft.com/office/drawing/2014/main" id="{34BDD74C-5263-464C-AA3C-D945D23978FF}"/>
-              </a:ext>
-            </a:extLst>
-          </p:cNvPr>
-          <p:cNvSpPr txBox="1">
-            <a:spLocks/>
-          </p:cNvSpPr>
-          <p:nvPr/>
-        </p:nvSpPr>
-        <p:spPr>
-          <a:xfrm>
-            <a:off x="4433852" y="4256429"/>
-            <a:ext cx="5756957" cy="927824"/>
-          </a:xfrm>
-          <a:prstGeom prst="rect">
-            <a:avLst/>
-          </a:prstGeom>
-        </p:spPr>
-        <p:txBody>
-          <a:bodyPr vert="horz" lIns="457200" tIns="45720" rIns="457200" bIns="45720" rtlCol="0" anchor="ctr">
-            <a:noAutofit/>
-          </a:bodyPr>
-          <a:lstStyle>
-            <a:lvl1pPr algn="ctr" defTabSz="914400" rtl="0" eaLnBrk="1" latinLnBrk="0" hangingPunct="1">
-              <a:lnSpc>
-                <a:spcPct val="90000"/>
-              </a:lnSpc>
-              <a:spcBef>
-                <a:spcPct val="0"/>
-              </a:spcBef>
-              <a:buNone/>
-              <a:defRPr lang="en-US" sz="3200" b="1" i="0" kern="1200" spc="300" dirty="0">
-                <a:solidFill>
-                  <a:schemeClr val="tx1">
-                    <a:lumMod val="85000"/>
-                    <a:lumOff val="15000"/>
-                  </a:schemeClr>
-                </a:solidFill>
-                <a:latin typeface="+mj-lt"/>
-                <a:ea typeface="+mn-ea"/>
-                <a:cs typeface="Segoe UI Semilight" panose="020B0402040204020203" pitchFamily="34" charset="0"/>
-              </a:defRPr>
-            </a:lvl1pPr>
-          </a:lstStyle>
-          <a:p>
-            <a:r>
-              <a:rPr lang="en-US"/>
-              <a:t>THANK YOU</a:t>
-            </a:r>
-          </a:p>
-        </p:txBody>
-      </p:sp>
-    </p:spTree>
-    <p:extLst>
-      <p:ext uri="{BB962C8B-B14F-4D97-AF65-F5344CB8AC3E}">
-        <p14:creationId xmlns:p14="http://schemas.microsoft.com/office/powerpoint/2010/main" val="3492825300"/>
-      </p:ext>
-    </p:extLst>
-  </p:cSld>
-  <p:clrMapOvr>
-    <a:masterClrMapping/>
-  </p:clrMapOvr>
-  <mc:AlternateContent xmlns:mc="http://schemas.openxmlformats.org/markup-compatibility/2006" xmlns:p14="http://schemas.microsoft.com/office/powerpoint/2010/main">
-    <mc:Choice Requires="p14">
-      <p:transition spd="med" p14:dur="700">
-        <p:fade/>
-      </p:transition>
-    </mc:Choice>
-    <mc:Fallback xmlns="">
-      <p:transition spd="med">
-        <p:fade/>
-      </p:transition>
-    </mc:Fallback>
-  </mc:AlternateContent>
+  <p:transition spd="slow">
+    <p:push dir="u"/>
+  </p:transition>
 </p:sld>
 </file>
 
@@ -42738,6 +42764,2088 @@
       </p:transition>
     </mc:Fallback>
   </mc:AlternateContent>
+</p:sld>
+</file>
+
+<file path=ppt/slides/slide20.xml><?xml version="1.0" encoding="utf-8"?>
+<p:sld xmlns:a="http://schemas.openxmlformats.org/drawingml/2006/main" xmlns:r="http://schemas.openxmlformats.org/officeDocument/2006/relationships" xmlns:p="http://schemas.openxmlformats.org/presentationml/2006/main">
+  <p:cSld>
+    <p:spTree>
+      <p:nvGrpSpPr>
+        <p:cNvPr id="1" name=""/>
+        <p:cNvGrpSpPr/>
+        <p:nvPr/>
+      </p:nvGrpSpPr>
+      <p:grpSpPr>
+        <a:xfrm>
+          <a:off x="0" y="0"/>
+          <a:ext cx="0" cy="0"/>
+          <a:chOff x="0" y="0"/>
+          <a:chExt cx="0" cy="0"/>
+        </a:xfrm>
+      </p:grpSpPr>
+      <p:pic>
+        <p:nvPicPr>
+          <p:cNvPr id="6" name="Picture 5"/>
+          <p:cNvPicPr>
+            <a:picLocks noChangeAspect="1"/>
+          </p:cNvPicPr>
+          <p:nvPr/>
+        </p:nvPicPr>
+        <p:blipFill>
+          <a:blip r:embed="rId2"/>
+          <a:stretch>
+            <a:fillRect/>
+          </a:stretch>
+        </p:blipFill>
+        <p:spPr>
+          <a:xfrm>
+            <a:off x="253755" y="3235569"/>
+            <a:ext cx="5857875" cy="2057400"/>
+          </a:xfrm>
+          <a:prstGeom prst="rect">
+            <a:avLst/>
+          </a:prstGeom>
+        </p:spPr>
+      </p:pic>
+      <p:sp>
+        <p:nvSpPr>
+          <p:cNvPr id="3" name="Text Placeholder 2"/>
+          <p:cNvSpPr>
+            <a:spLocks noGrp="1"/>
+          </p:cNvSpPr>
+          <p:nvPr>
+            <p:ph type="body" sz="quarter" idx="10"/>
+          </p:nvPr>
+        </p:nvSpPr>
+        <p:spPr>
+          <a:xfrm>
+            <a:off x="3923323" y="186061"/>
+            <a:ext cx="4376615" cy="1051570"/>
+          </a:xfrm>
+        </p:spPr>
+        <p:txBody>
+          <a:bodyPr/>
+          <a:lstStyle/>
+          <a:p>
+            <a:endParaRPr lang="en-IN" dirty="0"/>
+          </a:p>
+          <a:p>
+            <a:r>
+              <a:rPr lang="en-IN" dirty="0"/>
+              <a:t>CORRECT AND INCORRECT EXAMPLES:</a:t>
+            </a:r>
+          </a:p>
+        </p:txBody>
+      </p:sp>
+      <p:pic>
+        <p:nvPicPr>
+          <p:cNvPr id="7" name="Picture 6"/>
+          <p:cNvPicPr>
+            <a:picLocks noChangeAspect="1"/>
+          </p:cNvPicPr>
+          <p:nvPr/>
+        </p:nvPicPr>
+        <p:blipFill>
+          <a:blip r:embed="rId3"/>
+          <a:stretch>
+            <a:fillRect/>
+          </a:stretch>
+        </p:blipFill>
+        <p:spPr>
+          <a:xfrm>
+            <a:off x="6276975" y="3205162"/>
+            <a:ext cx="5915025" cy="2118214"/>
+          </a:xfrm>
+          <a:prstGeom prst="rect">
+            <a:avLst/>
+          </a:prstGeom>
+        </p:spPr>
+      </p:pic>
+      <p:sp>
+        <p:nvSpPr>
+          <p:cNvPr id="8" name="Right Arrow 7"/>
+          <p:cNvSpPr/>
+          <p:nvPr/>
+        </p:nvSpPr>
+        <p:spPr>
+          <a:xfrm rot="7197726">
+            <a:off x="3275520" y="2017301"/>
+            <a:ext cx="1536001" cy="595784"/>
+          </a:xfrm>
+          <a:prstGeom prst="rightArrow">
+            <a:avLst/>
+          </a:prstGeom>
+        </p:spPr>
+        <p:style>
+          <a:lnRef idx="2">
+            <a:schemeClr val="accent1">
+              <a:shade val="50000"/>
+            </a:schemeClr>
+          </a:lnRef>
+          <a:fillRef idx="1">
+            <a:schemeClr val="accent1"/>
+          </a:fillRef>
+          <a:effectRef idx="0">
+            <a:schemeClr val="accent1"/>
+          </a:effectRef>
+          <a:fontRef idx="minor">
+            <a:schemeClr val="lt1"/>
+          </a:fontRef>
+        </p:style>
+        <p:txBody>
+          <a:bodyPr rtlCol="0" anchor="ctr"/>
+          <a:lstStyle/>
+          <a:p>
+            <a:pPr algn="ctr"/>
+            <a:endParaRPr lang="en-IN" dirty="0"/>
+          </a:p>
+        </p:txBody>
+      </p:sp>
+      <p:sp>
+        <p:nvSpPr>
+          <p:cNvPr id="9" name="Right Arrow 8"/>
+          <p:cNvSpPr/>
+          <p:nvPr/>
+        </p:nvSpPr>
+        <p:spPr>
+          <a:xfrm rot="2841730">
+            <a:off x="7667625" y="2115390"/>
+            <a:ext cx="1655698" cy="484632"/>
+          </a:xfrm>
+          <a:prstGeom prst="rightArrow">
+            <a:avLst/>
+          </a:prstGeom>
+        </p:spPr>
+        <p:style>
+          <a:lnRef idx="2">
+            <a:schemeClr val="accent1">
+              <a:shade val="50000"/>
+            </a:schemeClr>
+          </a:lnRef>
+          <a:fillRef idx="1">
+            <a:schemeClr val="accent1"/>
+          </a:fillRef>
+          <a:effectRef idx="0">
+            <a:schemeClr val="accent1"/>
+          </a:effectRef>
+          <a:fontRef idx="minor">
+            <a:schemeClr val="lt1"/>
+          </a:fontRef>
+        </p:style>
+        <p:txBody>
+          <a:bodyPr rtlCol="0" anchor="ctr"/>
+          <a:lstStyle/>
+          <a:p>
+            <a:pPr algn="ctr"/>
+            <a:r>
+              <a:rPr lang="en-IN" dirty="0"/>
+              <a:t>INCORRECT</a:t>
+            </a:r>
+          </a:p>
+        </p:txBody>
+      </p:sp>
+      <p:sp>
+        <p:nvSpPr>
+          <p:cNvPr id="10" name="Rectangle 9"/>
+          <p:cNvSpPr/>
+          <p:nvPr/>
+        </p:nvSpPr>
+        <p:spPr>
+          <a:xfrm rot="17993501">
+            <a:off x="3466182" y="2173040"/>
+            <a:ext cx="1154675" cy="369332"/>
+          </a:xfrm>
+          <a:prstGeom prst="rect">
+            <a:avLst/>
+          </a:prstGeom>
+        </p:spPr>
+        <p:txBody>
+          <a:bodyPr wrap="none">
+            <a:spAutoFit/>
+          </a:bodyPr>
+          <a:lstStyle/>
+          <a:p>
+            <a:pPr algn="ctr"/>
+            <a:r>
+              <a:rPr lang="en-IN" dirty="0">
+                <a:solidFill>
+                  <a:schemeClr val="bg1"/>
+                </a:solidFill>
+              </a:rPr>
+              <a:t>CORRECT</a:t>
+            </a:r>
+          </a:p>
+        </p:txBody>
+      </p:sp>
+    </p:spTree>
+    <p:extLst>
+      <p:ext uri="{BB962C8B-B14F-4D97-AF65-F5344CB8AC3E}">
+        <p14:creationId xmlns:p14="http://schemas.microsoft.com/office/powerpoint/2010/main" val="3746032178"/>
+      </p:ext>
+    </p:extLst>
+  </p:cSld>
+  <p:clrMapOvr>
+    <a:masterClrMapping/>
+  </p:clrMapOvr>
+  <p:transition spd="slow">
+    <p:push dir="u"/>
+  </p:transition>
+</p:sld>
+</file>
+
+<file path=ppt/slides/slide21.xml><?xml version="1.0" encoding="utf-8"?>
+<p:sld xmlns:a="http://schemas.openxmlformats.org/drawingml/2006/main" xmlns:r="http://schemas.openxmlformats.org/officeDocument/2006/relationships" xmlns:p="http://schemas.openxmlformats.org/presentationml/2006/main">
+  <p:cSld>
+    <p:spTree>
+      <p:nvGrpSpPr>
+        <p:cNvPr id="1" name=""/>
+        <p:cNvGrpSpPr/>
+        <p:nvPr/>
+      </p:nvGrpSpPr>
+      <p:grpSpPr>
+        <a:xfrm>
+          <a:off x="0" y="0"/>
+          <a:ext cx="0" cy="0"/>
+          <a:chOff x="0" y="0"/>
+          <a:chExt cx="0" cy="0"/>
+        </a:xfrm>
+      </p:grpSpPr>
+      <p:sp>
+        <p:nvSpPr>
+          <p:cNvPr id="3" name="Text Placeholder 2"/>
+          <p:cNvSpPr>
+            <a:spLocks noGrp="1"/>
+          </p:cNvSpPr>
+          <p:nvPr>
+            <p:ph type="body" sz="quarter" idx="10"/>
+          </p:nvPr>
+        </p:nvSpPr>
+        <p:spPr>
+          <a:xfrm>
+            <a:off x="3875454" y="449830"/>
+            <a:ext cx="4376615" cy="646331"/>
+          </a:xfrm>
+        </p:spPr>
+        <p:txBody>
+          <a:bodyPr/>
+          <a:lstStyle/>
+          <a:p>
+            <a:r>
+              <a:rPr lang="en-IN" sz="4000" dirty="0"/>
+              <a:t>Evaluation</a:t>
+            </a:r>
+          </a:p>
+        </p:txBody>
+      </p:sp>
+      <p:sp>
+        <p:nvSpPr>
+          <p:cNvPr id="4" name="Text Placeholder 3"/>
+          <p:cNvSpPr>
+            <a:spLocks noGrp="1"/>
+          </p:cNvSpPr>
+          <p:nvPr>
+            <p:ph type="body" sz="quarter" idx="11"/>
+          </p:nvPr>
+        </p:nvSpPr>
+        <p:spPr>
+          <a:xfrm>
+            <a:off x="304801" y="4206240"/>
+            <a:ext cx="11658600" cy="424732"/>
+          </a:xfrm>
+        </p:spPr>
+        <p:txBody>
+          <a:bodyPr/>
+          <a:lstStyle/>
+          <a:p>
+            <a:endParaRPr lang="en-IN" dirty="0"/>
+          </a:p>
+        </p:txBody>
+      </p:sp>
+      <p:graphicFrame>
+        <p:nvGraphicFramePr>
+          <p:cNvPr id="6" name="Diagram 5"/>
+          <p:cNvGraphicFramePr/>
+          <p:nvPr>
+            <p:extLst>
+              <p:ext uri="{D42A27DB-BD31-4B8C-83A1-F6EECF244321}">
+                <p14:modId xmlns:p14="http://schemas.microsoft.com/office/powerpoint/2010/main" val="4175732629"/>
+              </p:ext>
+            </p:extLst>
+          </p:nvPr>
+        </p:nvGraphicFramePr>
+        <p:xfrm>
+          <a:off x="115276" y="1433145"/>
+          <a:ext cx="7103208" cy="4990058"/>
+        </p:xfrm>
+        <a:graphic>
+          <a:graphicData uri="http://schemas.openxmlformats.org/drawingml/2006/diagram">
+            <dgm:relIds xmlns:dgm="http://schemas.openxmlformats.org/drawingml/2006/diagram" xmlns:r="http://schemas.openxmlformats.org/officeDocument/2006/relationships" r:dm="rId2" r:lo="rId3" r:qs="rId4" r:cs="rId5"/>
+          </a:graphicData>
+        </a:graphic>
+      </p:graphicFrame>
+      <p:pic>
+        <p:nvPicPr>
+          <p:cNvPr id="7" name="Picture 6"/>
+          <p:cNvPicPr>
+            <a:picLocks noChangeAspect="1"/>
+          </p:cNvPicPr>
+          <p:nvPr/>
+        </p:nvPicPr>
+        <p:blipFill>
+          <a:blip r:embed="rId7"/>
+          <a:stretch>
+            <a:fillRect/>
+          </a:stretch>
+        </p:blipFill>
+        <p:spPr>
+          <a:xfrm>
+            <a:off x="7509730" y="3538904"/>
+            <a:ext cx="4162425" cy="2628900"/>
+          </a:xfrm>
+          <a:prstGeom prst="rect">
+            <a:avLst/>
+          </a:prstGeom>
+        </p:spPr>
+      </p:pic>
+      <p:pic>
+        <p:nvPicPr>
+          <p:cNvPr id="8" name="Picture 7"/>
+          <p:cNvPicPr>
+            <a:picLocks noChangeAspect="1"/>
+          </p:cNvPicPr>
+          <p:nvPr/>
+        </p:nvPicPr>
+        <p:blipFill>
+          <a:blip r:embed="rId8"/>
+          <a:stretch>
+            <a:fillRect/>
+          </a:stretch>
+        </p:blipFill>
+        <p:spPr>
+          <a:xfrm>
+            <a:off x="5833330" y="6275565"/>
+            <a:ext cx="5838825" cy="295275"/>
+          </a:xfrm>
+          <a:prstGeom prst="rect">
+            <a:avLst/>
+          </a:prstGeom>
+        </p:spPr>
+      </p:pic>
+      <p:sp>
+        <p:nvSpPr>
+          <p:cNvPr id="10" name="Right Arrow 9"/>
+          <p:cNvSpPr/>
+          <p:nvPr/>
+        </p:nvSpPr>
+        <p:spPr>
+          <a:xfrm>
+            <a:off x="3578469" y="6167804"/>
+            <a:ext cx="2083776" cy="592383"/>
+          </a:xfrm>
+          <a:prstGeom prst="rightArrow">
+            <a:avLst/>
+          </a:prstGeom>
+        </p:spPr>
+        <p:style>
+          <a:lnRef idx="2">
+            <a:schemeClr val="accent1">
+              <a:shade val="50000"/>
+            </a:schemeClr>
+          </a:lnRef>
+          <a:fillRef idx="1">
+            <a:schemeClr val="accent1"/>
+          </a:fillRef>
+          <a:effectRef idx="0">
+            <a:schemeClr val="accent1"/>
+          </a:effectRef>
+          <a:fontRef idx="minor">
+            <a:schemeClr val="lt1"/>
+          </a:fontRef>
+        </p:style>
+        <p:txBody>
+          <a:bodyPr rtlCol="0" anchor="ctr"/>
+          <a:lstStyle/>
+          <a:p>
+            <a:pPr algn="ctr"/>
+            <a:endParaRPr lang="en-IN" dirty="0"/>
+          </a:p>
+          <a:p>
+            <a:pPr algn="ctr"/>
+            <a:r>
+              <a:rPr lang="en-IN" dirty="0"/>
+              <a:t>Our Best Result:</a:t>
+            </a:r>
+          </a:p>
+          <a:p>
+            <a:pPr algn="ctr"/>
+            <a:endParaRPr lang="en-IN" dirty="0"/>
+          </a:p>
+        </p:txBody>
+      </p:sp>
+    </p:spTree>
+    <p:extLst>
+      <p:ext uri="{BB962C8B-B14F-4D97-AF65-F5344CB8AC3E}">
+        <p14:creationId xmlns:p14="http://schemas.microsoft.com/office/powerpoint/2010/main" val="2413825636"/>
+      </p:ext>
+    </p:extLst>
+  </p:cSld>
+  <p:clrMapOvr>
+    <a:masterClrMapping/>
+  </p:clrMapOvr>
+  <p:transition spd="slow">
+    <p:push dir="u"/>
+  </p:transition>
+</p:sld>
+</file>
+
+<file path=ppt/slides/slide22.xml><?xml version="1.0" encoding="utf-8"?>
+<p:sld xmlns:a="http://schemas.openxmlformats.org/drawingml/2006/main" xmlns:r="http://schemas.openxmlformats.org/officeDocument/2006/relationships" xmlns:p="http://schemas.openxmlformats.org/presentationml/2006/main">
+  <p:cSld>
+    <p:spTree>
+      <p:nvGrpSpPr>
+        <p:cNvPr id="1" name=""/>
+        <p:cNvGrpSpPr/>
+        <p:nvPr/>
+      </p:nvGrpSpPr>
+      <p:grpSpPr>
+        <a:xfrm>
+          <a:off x="0" y="0"/>
+          <a:ext cx="0" cy="0"/>
+          <a:chOff x="0" y="0"/>
+          <a:chExt cx="0" cy="0"/>
+        </a:xfrm>
+      </p:grpSpPr>
+      <p:sp>
+        <p:nvSpPr>
+          <p:cNvPr id="14" name="Oval 13"/>
+          <p:cNvSpPr/>
+          <p:nvPr/>
+        </p:nvSpPr>
+        <p:spPr>
+          <a:xfrm>
+            <a:off x="1219939" y="-739444"/>
+            <a:ext cx="9107555" cy="9034439"/>
+          </a:xfrm>
+          <a:prstGeom prst="ellipse">
+            <a:avLst/>
+          </a:prstGeom>
+          <a:noFill/>
+          <a:ln w="19050">
+            <a:solidFill>
+              <a:schemeClr val="accent1"/>
+            </a:solidFill>
+          </a:ln>
+          <a:effectLst/>
+        </p:spPr>
+        <p:style>
+          <a:lnRef idx="2">
+            <a:schemeClr val="accent1">
+              <a:shade val="50000"/>
+            </a:schemeClr>
+          </a:lnRef>
+          <a:fillRef idx="1">
+            <a:schemeClr val="accent1"/>
+          </a:fillRef>
+          <a:effectRef idx="0">
+            <a:schemeClr val="accent1"/>
+          </a:effectRef>
+          <a:fontRef idx="minor">
+            <a:schemeClr val="lt1"/>
+          </a:fontRef>
+        </p:style>
+        <p:txBody>
+          <a:bodyPr rtlCol="0" anchor="ctr"/>
+          <a:lstStyle/>
+          <a:p>
+            <a:pPr marL="0" marR="0" lvl="0" indent="0" algn="ctr" defTabSz="914400" eaLnBrk="1" fontAlgn="auto" latinLnBrk="0" hangingPunct="1">
+              <a:lnSpc>
+                <a:spcPct val="100000"/>
+              </a:lnSpc>
+              <a:spcBef>
+                <a:spcPts val="0"/>
+              </a:spcBef>
+              <a:spcAft>
+                <a:spcPts val="0"/>
+              </a:spcAft>
+              <a:buClrTx/>
+              <a:buSzTx/>
+              <a:buFontTx/>
+              <a:buNone/>
+              <a:tabLst/>
+              <a:defRPr/>
+            </a:pPr>
+            <a:endParaRPr kumimoji="0" lang="en-AU" sz="1800" b="0" i="0" u="none" strike="noStrike" kern="0" cap="none" spc="0" normalizeH="0" baseline="0" noProof="0">
+              <a:ln>
+                <a:noFill/>
+              </a:ln>
+              <a:solidFill>
+                <a:sysClr val="windowText" lastClr="000000"/>
+              </a:solidFill>
+              <a:effectLst/>
+              <a:uLnTx/>
+              <a:uFillTx/>
+            </a:endParaRPr>
+          </a:p>
+        </p:txBody>
+      </p:sp>
+      <p:sp>
+        <p:nvSpPr>
+          <p:cNvPr id="15" name="Oval 14"/>
+          <p:cNvSpPr/>
+          <p:nvPr/>
+        </p:nvSpPr>
+        <p:spPr>
+          <a:xfrm>
+            <a:off x="1219939" y="-739444"/>
+            <a:ext cx="9107555" cy="9034439"/>
+          </a:xfrm>
+          <a:prstGeom prst="ellipse">
+            <a:avLst/>
+          </a:prstGeom>
+          <a:noFill/>
+          <a:ln w="19050">
+            <a:solidFill>
+              <a:schemeClr val="accent1"/>
+            </a:solidFill>
+          </a:ln>
+          <a:effectLst/>
+        </p:spPr>
+        <p:style>
+          <a:lnRef idx="2">
+            <a:schemeClr val="accent1">
+              <a:shade val="50000"/>
+            </a:schemeClr>
+          </a:lnRef>
+          <a:fillRef idx="1">
+            <a:schemeClr val="accent1"/>
+          </a:fillRef>
+          <a:effectRef idx="0">
+            <a:schemeClr val="accent1"/>
+          </a:effectRef>
+          <a:fontRef idx="minor">
+            <a:schemeClr val="lt1"/>
+          </a:fontRef>
+        </p:style>
+        <p:txBody>
+          <a:bodyPr rtlCol="0" anchor="ctr"/>
+          <a:lstStyle/>
+          <a:p>
+            <a:pPr marL="0" marR="0" lvl="0" indent="0" algn="ctr" defTabSz="914400" eaLnBrk="1" fontAlgn="auto" latinLnBrk="0" hangingPunct="1">
+              <a:lnSpc>
+                <a:spcPct val="100000"/>
+              </a:lnSpc>
+              <a:spcBef>
+                <a:spcPts val="0"/>
+              </a:spcBef>
+              <a:spcAft>
+                <a:spcPts val="0"/>
+              </a:spcAft>
+              <a:buClrTx/>
+              <a:buSzTx/>
+              <a:buFontTx/>
+              <a:buNone/>
+              <a:tabLst/>
+              <a:defRPr/>
+            </a:pPr>
+            <a:endParaRPr kumimoji="0" lang="en-AU" sz="1800" b="0" i="0" u="none" strike="noStrike" kern="0" cap="none" spc="0" normalizeH="0" baseline="0" noProof="0">
+              <a:ln>
+                <a:noFill/>
+              </a:ln>
+              <a:solidFill>
+                <a:sysClr val="windowText" lastClr="000000"/>
+              </a:solidFill>
+              <a:effectLst/>
+              <a:uLnTx/>
+              <a:uFillTx/>
+            </a:endParaRPr>
+          </a:p>
+        </p:txBody>
+      </p:sp>
+      <p:sp>
+        <p:nvSpPr>
+          <p:cNvPr id="16" name="Oval 15"/>
+          <p:cNvSpPr/>
+          <p:nvPr/>
+        </p:nvSpPr>
+        <p:spPr>
+          <a:xfrm>
+            <a:off x="1219939" y="-739444"/>
+            <a:ext cx="9107555" cy="9034439"/>
+          </a:xfrm>
+          <a:prstGeom prst="ellipse">
+            <a:avLst/>
+          </a:prstGeom>
+          <a:noFill/>
+          <a:ln w="19050">
+            <a:solidFill>
+              <a:schemeClr val="accent1"/>
+            </a:solidFill>
+          </a:ln>
+          <a:effectLst/>
+        </p:spPr>
+        <p:style>
+          <a:lnRef idx="2">
+            <a:schemeClr val="accent1">
+              <a:shade val="50000"/>
+            </a:schemeClr>
+          </a:lnRef>
+          <a:fillRef idx="1">
+            <a:schemeClr val="accent1"/>
+          </a:fillRef>
+          <a:effectRef idx="0">
+            <a:schemeClr val="accent1"/>
+          </a:effectRef>
+          <a:fontRef idx="minor">
+            <a:schemeClr val="lt1"/>
+          </a:fontRef>
+        </p:style>
+        <p:txBody>
+          <a:bodyPr rtlCol="0" anchor="ctr"/>
+          <a:lstStyle/>
+          <a:p>
+            <a:pPr marL="0" marR="0" lvl="0" indent="0" algn="ctr" defTabSz="914400" eaLnBrk="1" fontAlgn="auto" latinLnBrk="0" hangingPunct="1">
+              <a:lnSpc>
+                <a:spcPct val="100000"/>
+              </a:lnSpc>
+              <a:spcBef>
+                <a:spcPts val="0"/>
+              </a:spcBef>
+              <a:spcAft>
+                <a:spcPts val="0"/>
+              </a:spcAft>
+              <a:buClrTx/>
+              <a:buSzTx/>
+              <a:buFontTx/>
+              <a:buNone/>
+              <a:tabLst/>
+              <a:defRPr/>
+            </a:pPr>
+            <a:endParaRPr kumimoji="0" lang="en-AU" sz="1800" b="0" i="0" u="none" strike="noStrike" kern="0" cap="none" spc="0" normalizeH="0" baseline="0" noProof="0">
+              <a:ln>
+                <a:noFill/>
+              </a:ln>
+              <a:solidFill>
+                <a:sysClr val="windowText" lastClr="000000"/>
+              </a:solidFill>
+              <a:effectLst/>
+              <a:uLnTx/>
+              <a:uFillTx/>
+            </a:endParaRPr>
+          </a:p>
+        </p:txBody>
+      </p:sp>
+      <p:sp>
+        <p:nvSpPr>
+          <p:cNvPr id="10" name="Oval 9"/>
+          <p:cNvSpPr/>
+          <p:nvPr/>
+        </p:nvSpPr>
+        <p:spPr>
+          <a:xfrm>
+            <a:off x="5907634" y="3213970"/>
+            <a:ext cx="2805809" cy="2783284"/>
+          </a:xfrm>
+          <a:prstGeom prst="ellipse">
+            <a:avLst/>
+          </a:prstGeom>
+          <a:noFill/>
+          <a:ln w="19050">
+            <a:solidFill>
+              <a:schemeClr val="accent1"/>
+            </a:solidFill>
+          </a:ln>
+          <a:effectLst/>
+        </p:spPr>
+        <p:style>
+          <a:lnRef idx="2">
+            <a:schemeClr val="accent1">
+              <a:shade val="50000"/>
+            </a:schemeClr>
+          </a:lnRef>
+          <a:fillRef idx="1">
+            <a:schemeClr val="accent1"/>
+          </a:fillRef>
+          <a:effectRef idx="0">
+            <a:schemeClr val="accent1"/>
+          </a:effectRef>
+          <a:fontRef idx="minor">
+            <a:schemeClr val="lt1"/>
+          </a:fontRef>
+        </p:style>
+        <p:txBody>
+          <a:bodyPr rtlCol="0" anchor="ctr"/>
+          <a:lstStyle/>
+          <a:p>
+            <a:pPr marL="0" marR="0" lvl="0" indent="0" algn="ctr" defTabSz="914400" eaLnBrk="1" fontAlgn="auto" latinLnBrk="0" hangingPunct="1">
+              <a:lnSpc>
+                <a:spcPct val="100000"/>
+              </a:lnSpc>
+              <a:spcBef>
+                <a:spcPts val="0"/>
+              </a:spcBef>
+              <a:spcAft>
+                <a:spcPts val="0"/>
+              </a:spcAft>
+              <a:buClrTx/>
+              <a:buSzTx/>
+              <a:buFontTx/>
+              <a:buNone/>
+              <a:tabLst/>
+              <a:defRPr/>
+            </a:pPr>
+            <a:endParaRPr kumimoji="0" lang="en-AU" sz="1800" b="0" i="0" u="none" strike="noStrike" kern="0" cap="none" spc="0" normalizeH="0" baseline="0" noProof="0">
+              <a:ln>
+                <a:noFill/>
+              </a:ln>
+              <a:solidFill>
+                <a:sysClr val="windowText" lastClr="000000"/>
+              </a:solidFill>
+              <a:effectLst/>
+              <a:uLnTx/>
+              <a:uFillTx/>
+            </a:endParaRPr>
+          </a:p>
+        </p:txBody>
+      </p:sp>
+      <p:sp>
+        <p:nvSpPr>
+          <p:cNvPr id="11" name="Oval 10"/>
+          <p:cNvSpPr/>
+          <p:nvPr/>
+        </p:nvSpPr>
+        <p:spPr>
+          <a:xfrm>
+            <a:off x="5907634" y="3213970"/>
+            <a:ext cx="2805809" cy="2783284"/>
+          </a:xfrm>
+          <a:prstGeom prst="ellipse">
+            <a:avLst/>
+          </a:prstGeom>
+          <a:noFill/>
+          <a:ln w="19050">
+            <a:solidFill>
+              <a:schemeClr val="accent1"/>
+            </a:solidFill>
+          </a:ln>
+          <a:effectLst/>
+        </p:spPr>
+        <p:style>
+          <a:lnRef idx="2">
+            <a:schemeClr val="accent1">
+              <a:shade val="50000"/>
+            </a:schemeClr>
+          </a:lnRef>
+          <a:fillRef idx="1">
+            <a:schemeClr val="accent1"/>
+          </a:fillRef>
+          <a:effectRef idx="0">
+            <a:schemeClr val="accent1"/>
+          </a:effectRef>
+          <a:fontRef idx="minor">
+            <a:schemeClr val="lt1"/>
+          </a:fontRef>
+        </p:style>
+        <p:txBody>
+          <a:bodyPr rtlCol="0" anchor="ctr"/>
+          <a:lstStyle/>
+          <a:p>
+            <a:pPr marL="0" marR="0" lvl="0" indent="0" algn="ctr" defTabSz="914400" eaLnBrk="1" fontAlgn="auto" latinLnBrk="0" hangingPunct="1">
+              <a:lnSpc>
+                <a:spcPct val="100000"/>
+              </a:lnSpc>
+              <a:spcBef>
+                <a:spcPts val="0"/>
+              </a:spcBef>
+              <a:spcAft>
+                <a:spcPts val="0"/>
+              </a:spcAft>
+              <a:buClrTx/>
+              <a:buSzTx/>
+              <a:buFontTx/>
+              <a:buNone/>
+              <a:tabLst/>
+              <a:defRPr/>
+            </a:pPr>
+            <a:endParaRPr kumimoji="0" lang="en-AU" sz="1800" b="0" i="0" u="none" strike="noStrike" kern="0" cap="none" spc="0" normalizeH="0" baseline="0" noProof="0">
+              <a:ln>
+                <a:noFill/>
+              </a:ln>
+              <a:solidFill>
+                <a:sysClr val="windowText" lastClr="000000"/>
+              </a:solidFill>
+              <a:effectLst/>
+              <a:uLnTx/>
+              <a:uFillTx/>
+            </a:endParaRPr>
+          </a:p>
+        </p:txBody>
+      </p:sp>
+      <p:sp>
+        <p:nvSpPr>
+          <p:cNvPr id="12" name="Oval 11"/>
+          <p:cNvSpPr/>
+          <p:nvPr/>
+        </p:nvSpPr>
+        <p:spPr>
+          <a:xfrm>
+            <a:off x="5907634" y="3213970"/>
+            <a:ext cx="2805809" cy="2783284"/>
+          </a:xfrm>
+          <a:prstGeom prst="ellipse">
+            <a:avLst/>
+          </a:prstGeom>
+          <a:noFill/>
+          <a:ln w="19050" cmpd="thinThick">
+            <a:solidFill>
+              <a:schemeClr val="accent1"/>
+            </a:solidFill>
+            <a:prstDash val="solid"/>
+          </a:ln>
+          <a:effectLst/>
+        </p:spPr>
+        <p:style>
+          <a:lnRef idx="2">
+            <a:schemeClr val="accent1">
+              <a:shade val="50000"/>
+            </a:schemeClr>
+          </a:lnRef>
+          <a:fillRef idx="1">
+            <a:schemeClr val="accent1"/>
+          </a:fillRef>
+          <a:effectRef idx="0">
+            <a:schemeClr val="accent1"/>
+          </a:effectRef>
+          <a:fontRef idx="minor">
+            <a:schemeClr val="lt1"/>
+          </a:fontRef>
+        </p:style>
+        <p:txBody>
+          <a:bodyPr rtlCol="0" anchor="ctr"/>
+          <a:lstStyle/>
+          <a:p>
+            <a:pPr marL="0" marR="0" lvl="0" indent="0" algn="ctr" defTabSz="914400" eaLnBrk="1" fontAlgn="auto" latinLnBrk="0" hangingPunct="1">
+              <a:lnSpc>
+                <a:spcPct val="100000"/>
+              </a:lnSpc>
+              <a:spcBef>
+                <a:spcPts val="0"/>
+              </a:spcBef>
+              <a:spcAft>
+                <a:spcPts val="0"/>
+              </a:spcAft>
+              <a:buClrTx/>
+              <a:buSzTx/>
+              <a:buFontTx/>
+              <a:buNone/>
+              <a:tabLst/>
+              <a:defRPr/>
+            </a:pPr>
+            <a:endParaRPr kumimoji="0" lang="en-AU" sz="1800" b="0" i="0" u="none" strike="noStrike" kern="0" cap="none" spc="0" normalizeH="0" baseline="0" noProof="0">
+              <a:ln>
+                <a:noFill/>
+              </a:ln>
+              <a:solidFill>
+                <a:sysClr val="windowText" lastClr="000000"/>
+              </a:solidFill>
+              <a:effectLst/>
+              <a:uLnTx/>
+              <a:uFillTx/>
+            </a:endParaRPr>
+          </a:p>
+        </p:txBody>
+      </p:sp>
+      <p:sp>
+        <p:nvSpPr>
+          <p:cNvPr id="46" name="Rectangle 45"/>
+          <p:cNvSpPr/>
+          <p:nvPr/>
+        </p:nvSpPr>
+        <p:spPr>
+          <a:xfrm flipH="1">
+            <a:off x="7911252" y="4253573"/>
+            <a:ext cx="3492608" cy="704078"/>
+          </a:xfrm>
+          <a:prstGeom prst="rect">
+            <a:avLst/>
+          </a:prstGeom>
+          <a:solidFill>
+            <a:schemeClr val="bg2"/>
+          </a:solidFill>
+          <a:ln>
+            <a:noFill/>
+          </a:ln>
+        </p:spPr>
+        <p:style>
+          <a:lnRef idx="2">
+            <a:schemeClr val="accent1">
+              <a:shade val="50000"/>
+            </a:schemeClr>
+          </a:lnRef>
+          <a:fillRef idx="1">
+            <a:schemeClr val="accent1"/>
+          </a:fillRef>
+          <a:effectRef idx="0">
+            <a:schemeClr val="accent1"/>
+          </a:effectRef>
+          <a:fontRef idx="minor">
+            <a:schemeClr val="lt1"/>
+          </a:fontRef>
+        </p:style>
+        <p:txBody>
+          <a:bodyPr rtlCol="0" anchor="ctr"/>
+          <a:lstStyle/>
+          <a:p>
+            <a:pPr lvl="0" algn="ctr">
+              <a:lnSpc>
+                <a:spcPct val="90000"/>
+              </a:lnSpc>
+            </a:pPr>
+            <a:r>
+              <a:rPr lang="en-US" sz="4800" dirty="0">
+                <a:gradFill>
+                  <a:gsLst>
+                    <a:gs pos="0">
+                      <a:srgbClr val="75D1FF">
+                        <a:lumMod val="5000"/>
+                        <a:lumOff val="95000"/>
+                      </a:srgbClr>
+                    </a:gs>
+                    <a:gs pos="100000">
+                      <a:srgbClr val="FFFFFF"/>
+                    </a:gs>
+                  </a:gsLst>
+                  <a:lin ang="5400000" scaled="1"/>
+                </a:gradFill>
+              </a:rPr>
+              <a:t>Thank You</a:t>
+            </a:r>
+          </a:p>
+        </p:txBody>
+      </p:sp>
+      <p:sp>
+        <p:nvSpPr>
+          <p:cNvPr id="9" name="Title 6"/>
+          <p:cNvSpPr txBox="1">
+            <a:spLocks/>
+          </p:cNvSpPr>
+          <p:nvPr/>
+        </p:nvSpPr>
+        <p:spPr>
+          <a:xfrm>
+            <a:off x="1679957" y="3280601"/>
+            <a:ext cx="5909265" cy="874205"/>
+          </a:xfrm>
+          <a:prstGeom prst="rect">
+            <a:avLst/>
+          </a:prstGeom>
+        </p:spPr>
+        <p:txBody>
+          <a:bodyPr vert="horz" lIns="91440" tIns="0" rIns="91440" bIns="0" rtlCol="0" anchor="ctr">
+            <a:noAutofit/>
+          </a:bodyPr>
+          <a:lstStyle>
+            <a:lvl1pPr algn="ctr" defTabSz="914400" rtl="0" eaLnBrk="1" latinLnBrk="0" hangingPunct="1">
+              <a:lnSpc>
+                <a:spcPct val="90000"/>
+              </a:lnSpc>
+              <a:spcBef>
+                <a:spcPct val="0"/>
+              </a:spcBef>
+              <a:buNone/>
+              <a:defRPr lang="en-US" sz="3200" b="1" i="0" kern="1200" spc="300" dirty="0">
+                <a:solidFill>
+                  <a:schemeClr val="tx1">
+                    <a:lumMod val="85000"/>
+                    <a:lumOff val="15000"/>
+                  </a:schemeClr>
+                </a:solidFill>
+                <a:latin typeface="+mj-lt"/>
+                <a:ea typeface="+mn-ea"/>
+                <a:cs typeface="Segoe UI Semilight" panose="020B0402040204020203" pitchFamily="34" charset="0"/>
+              </a:defRPr>
+            </a:lvl1pPr>
+          </a:lstStyle>
+          <a:p>
+            <a:endParaRPr lang="en-US" sz="8800" spc="-300" dirty="0">
+              <a:gradFill>
+                <a:gsLst>
+                  <a:gs pos="0">
+                    <a:schemeClr val="accent1">
+                      <a:lumMod val="5000"/>
+                      <a:lumOff val="95000"/>
+                    </a:schemeClr>
+                  </a:gs>
+                  <a:gs pos="100000">
+                    <a:schemeClr val="bg1"/>
+                  </a:gs>
+                </a:gsLst>
+                <a:lin ang="5400000" scaled="1"/>
+              </a:gradFill>
+              <a:latin typeface="+mn-lt"/>
+            </a:endParaRPr>
+          </a:p>
+        </p:txBody>
+      </p:sp>
+      <p:sp>
+        <p:nvSpPr>
+          <p:cNvPr id="19" name="Freeform: Shape 18"/>
+          <p:cNvSpPr/>
+          <p:nvPr/>
+        </p:nvSpPr>
+        <p:spPr>
+          <a:xfrm>
+            <a:off x="7066536" y="4361548"/>
+            <a:ext cx="488128" cy="488128"/>
+          </a:xfrm>
+          <a:custGeom>
+            <a:avLst/>
+            <a:gdLst>
+              <a:gd name="connsiteX0" fmla="*/ 244064 w 488128"/>
+              <a:gd name="connsiteY0" fmla="*/ 0 h 488128"/>
+              <a:gd name="connsiteX1" fmla="*/ 488128 w 488128"/>
+              <a:gd name="connsiteY1" fmla="*/ 244064 h 488128"/>
+              <a:gd name="connsiteX2" fmla="*/ 244064 w 488128"/>
+              <a:gd name="connsiteY2" fmla="*/ 488128 h 488128"/>
+              <a:gd name="connsiteX3" fmla="*/ 0 w 488128"/>
+              <a:gd name="connsiteY3" fmla="*/ 244064 h 488128"/>
+              <a:gd name="connsiteX4" fmla="*/ 244064 w 488128"/>
+              <a:gd name="connsiteY4" fmla="*/ 0 h 488128"/>
+            </a:gdLst>
+            <a:ahLst/>
+            <a:cxnLst>
+              <a:cxn ang="0">
+                <a:pos x="connsiteX0" y="connsiteY0"/>
+              </a:cxn>
+              <a:cxn ang="0">
+                <a:pos x="connsiteX1" y="connsiteY1"/>
+              </a:cxn>
+              <a:cxn ang="0">
+                <a:pos x="connsiteX2" y="connsiteY2"/>
+              </a:cxn>
+              <a:cxn ang="0">
+                <a:pos x="connsiteX3" y="connsiteY3"/>
+              </a:cxn>
+              <a:cxn ang="0">
+                <a:pos x="connsiteX4" y="connsiteY4"/>
+              </a:cxn>
+            </a:cxnLst>
+            <a:rect l="l" t="t" r="r" b="b"/>
+            <a:pathLst>
+              <a:path w="488128" h="488128">
+                <a:moveTo>
+                  <a:pt x="244064" y="0"/>
+                </a:moveTo>
+                <a:cubicBezTo>
+                  <a:pt x="378857" y="0"/>
+                  <a:pt x="488128" y="109271"/>
+                  <a:pt x="488128" y="244064"/>
+                </a:cubicBezTo>
+                <a:cubicBezTo>
+                  <a:pt x="488128" y="378857"/>
+                  <a:pt x="378857" y="488128"/>
+                  <a:pt x="244064" y="488128"/>
+                </a:cubicBezTo>
+                <a:cubicBezTo>
+                  <a:pt x="109271" y="488128"/>
+                  <a:pt x="0" y="378857"/>
+                  <a:pt x="0" y="244064"/>
+                </a:cubicBezTo>
+                <a:cubicBezTo>
+                  <a:pt x="0" y="109271"/>
+                  <a:pt x="109271" y="0"/>
+                  <a:pt x="244064" y="0"/>
+                </a:cubicBezTo>
+                <a:close/>
+              </a:path>
+            </a:pathLst>
+          </a:custGeom>
+          <a:solidFill>
+            <a:schemeClr val="accent4"/>
+          </a:solidFill>
+          <a:ln>
+            <a:noFill/>
+          </a:ln>
+        </p:spPr>
+        <p:style>
+          <a:lnRef idx="2">
+            <a:schemeClr val="accent1">
+              <a:shade val="50000"/>
+            </a:schemeClr>
+          </a:lnRef>
+          <a:fillRef idx="1">
+            <a:schemeClr val="accent1"/>
+          </a:fillRef>
+          <a:effectRef idx="0">
+            <a:schemeClr val="accent1"/>
+          </a:effectRef>
+          <a:fontRef idx="minor">
+            <a:schemeClr val="lt1"/>
+          </a:fontRef>
+        </p:style>
+        <p:txBody>
+          <a:bodyPr wrap="square" rtlCol="0" anchor="ctr">
+            <a:noAutofit/>
+          </a:bodyPr>
+          <a:lstStyle/>
+          <a:p>
+            <a:pPr marL="0" marR="0" lvl="0" indent="0" algn="ctr" defTabSz="914400" eaLnBrk="1" fontAlgn="auto" latinLnBrk="0" hangingPunct="1">
+              <a:lnSpc>
+                <a:spcPct val="100000"/>
+              </a:lnSpc>
+              <a:spcBef>
+                <a:spcPts val="0"/>
+              </a:spcBef>
+              <a:spcAft>
+                <a:spcPts val="0"/>
+              </a:spcAft>
+              <a:buClrTx/>
+              <a:buSzTx/>
+              <a:buFontTx/>
+              <a:buNone/>
+              <a:tabLst/>
+              <a:defRPr/>
+            </a:pPr>
+            <a:endParaRPr kumimoji="0" lang="en-AU" sz="1800" b="0" i="0" u="none" strike="noStrike" kern="0" cap="none" spc="0" normalizeH="0" baseline="0" noProof="0">
+              <a:ln>
+                <a:noFill/>
+              </a:ln>
+              <a:solidFill>
+                <a:sysClr val="windowText" lastClr="000000"/>
+              </a:solidFill>
+              <a:effectLst/>
+              <a:uLnTx/>
+              <a:uFillTx/>
+            </a:endParaRPr>
+          </a:p>
+        </p:txBody>
+      </p:sp>
+      <p:sp>
+        <p:nvSpPr>
+          <p:cNvPr id="3" name="Slide Number Placeholder 2"/>
+          <p:cNvSpPr>
+            <a:spLocks noGrp="1"/>
+          </p:cNvSpPr>
+          <p:nvPr>
+            <p:ph type="sldNum" sz="quarter" idx="12"/>
+          </p:nvPr>
+        </p:nvSpPr>
+        <p:spPr/>
+        <p:txBody>
+          <a:bodyPr/>
+          <a:lstStyle/>
+          <a:p>
+            <a:fld id="{5AE1514C-5E56-4738-A1FF-4B1CFD2A3E36}" type="slidenum">
+              <a:rPr lang="en-US" smtClean="0"/>
+              <a:t>22</a:t>
+            </a:fld>
+            <a:endParaRPr lang="en-US"/>
+          </a:p>
+        </p:txBody>
+      </p:sp>
+    </p:spTree>
+    <p:extLst>
+      <p:ext uri="{BB962C8B-B14F-4D97-AF65-F5344CB8AC3E}">
+        <p14:creationId xmlns:p14="http://schemas.microsoft.com/office/powerpoint/2010/main" val="2602421783"/>
+      </p:ext>
+    </p:extLst>
+  </p:cSld>
+  <p:clrMapOvr>
+    <a:masterClrMapping/>
+  </p:clrMapOvr>
+  <mc:AlternateContent xmlns:mc="http://schemas.openxmlformats.org/markup-compatibility/2006" xmlns:p14="http://schemas.microsoft.com/office/powerpoint/2010/main">
+    <mc:Choice Requires="p14">
+      <p:transition spd="med" p14:dur="700">
+        <p:fade/>
+      </p:transition>
+    </mc:Choice>
+    <mc:Fallback xmlns="">
+      <p:transition spd="med">
+        <p:fade/>
+      </p:transition>
+    </mc:Fallback>
+  </mc:AlternateContent>
+  <p:timing>
+    <p:tnLst>
+      <p:par>
+        <p:cTn id="1" dur="indefinite" restart="never" nodeType="tmRoot">
+          <p:childTnLst>
+            <p:seq concurrent="1" nextAc="seek">
+              <p:cTn id="2" dur="indefinite" nodeType="mainSeq">
+                <p:childTnLst>
+                  <p:par>
+                    <p:cTn id="3" fill="hold">
+                      <p:stCondLst>
+                        <p:cond delay="indefinite"/>
+                        <p:cond evt="onBegin" delay="0">
+                          <p:tn val="2"/>
+                        </p:cond>
+                      </p:stCondLst>
+                      <p:childTnLst>
+                        <p:par>
+                          <p:cTn id="4" fill="hold">
+                            <p:stCondLst>
+                              <p:cond delay="0"/>
+                            </p:stCondLst>
+                            <p:childTnLst>
+                              <p:par>
+                                <p:cTn id="5" presetID="53" presetClass="entr" presetSubtype="16" fill="hold" grpId="0" nodeType="withEffect">
+                                  <p:stCondLst>
+                                    <p:cond delay="0"/>
+                                  </p:stCondLst>
+                                  <p:childTnLst>
+                                    <p:set>
+                                      <p:cBhvr>
+                                        <p:cTn id="6" dur="1" fill="hold">
+                                          <p:stCondLst>
+                                            <p:cond delay="0"/>
+                                          </p:stCondLst>
+                                        </p:cTn>
+                                        <p:tgtEl>
+                                          <p:spTgt spid="14"/>
+                                        </p:tgtEl>
+                                        <p:attrNameLst>
+                                          <p:attrName>style.visibility</p:attrName>
+                                        </p:attrNameLst>
+                                      </p:cBhvr>
+                                      <p:to>
+                                        <p:strVal val="visible"/>
+                                      </p:to>
+                                    </p:set>
+                                    <p:anim calcmode="lin" valueType="num">
+                                      <p:cBhvr>
+                                        <p:cTn id="7" dur="500" fill="hold"/>
+                                        <p:tgtEl>
+                                          <p:spTgt spid="14"/>
+                                        </p:tgtEl>
+                                        <p:attrNameLst>
+                                          <p:attrName>ppt_w</p:attrName>
+                                        </p:attrNameLst>
+                                      </p:cBhvr>
+                                      <p:tavLst>
+                                        <p:tav tm="0">
+                                          <p:val>
+                                            <p:fltVal val="0"/>
+                                          </p:val>
+                                        </p:tav>
+                                        <p:tav tm="100000">
+                                          <p:val>
+                                            <p:strVal val="#ppt_w"/>
+                                          </p:val>
+                                        </p:tav>
+                                      </p:tavLst>
+                                    </p:anim>
+                                    <p:anim calcmode="lin" valueType="num">
+                                      <p:cBhvr>
+                                        <p:cTn id="8" dur="500" fill="hold"/>
+                                        <p:tgtEl>
+                                          <p:spTgt spid="14"/>
+                                        </p:tgtEl>
+                                        <p:attrNameLst>
+                                          <p:attrName>ppt_h</p:attrName>
+                                        </p:attrNameLst>
+                                      </p:cBhvr>
+                                      <p:tavLst>
+                                        <p:tav tm="0">
+                                          <p:val>
+                                            <p:fltVal val="0"/>
+                                          </p:val>
+                                        </p:tav>
+                                        <p:tav tm="100000">
+                                          <p:val>
+                                            <p:strVal val="#ppt_h"/>
+                                          </p:val>
+                                        </p:tav>
+                                      </p:tavLst>
+                                    </p:anim>
+                                    <p:animEffect transition="in" filter="fade">
+                                      <p:cBhvr>
+                                        <p:cTn id="9" dur="500"/>
+                                        <p:tgtEl>
+                                          <p:spTgt spid="14"/>
+                                        </p:tgtEl>
+                                      </p:cBhvr>
+                                    </p:animEffect>
+                                  </p:childTnLst>
+                                </p:cTn>
+                              </p:par>
+                              <p:par>
+                                <p:cTn id="10" presetID="10" presetClass="exit" presetSubtype="0" fill="hold" grpId="1" nodeType="withEffect">
+                                  <p:stCondLst>
+                                    <p:cond delay="250"/>
+                                  </p:stCondLst>
+                                  <p:childTnLst>
+                                    <p:animEffect transition="out" filter="fade">
+                                      <p:cBhvr>
+                                        <p:cTn id="11" dur="500"/>
+                                        <p:tgtEl>
+                                          <p:spTgt spid="14"/>
+                                        </p:tgtEl>
+                                      </p:cBhvr>
+                                    </p:animEffect>
+                                    <p:set>
+                                      <p:cBhvr>
+                                        <p:cTn id="12" dur="1" fill="hold">
+                                          <p:stCondLst>
+                                            <p:cond delay="499"/>
+                                          </p:stCondLst>
+                                        </p:cTn>
+                                        <p:tgtEl>
+                                          <p:spTgt spid="14"/>
+                                        </p:tgtEl>
+                                        <p:attrNameLst>
+                                          <p:attrName>style.visibility</p:attrName>
+                                        </p:attrNameLst>
+                                      </p:cBhvr>
+                                      <p:to>
+                                        <p:strVal val="hidden"/>
+                                      </p:to>
+                                    </p:set>
+                                  </p:childTnLst>
+                                </p:cTn>
+                              </p:par>
+                              <p:par>
+                                <p:cTn id="13" presetID="53" presetClass="entr" presetSubtype="16" fill="hold" grpId="0" nodeType="withEffect">
+                                  <p:stCondLst>
+                                    <p:cond delay="250"/>
+                                  </p:stCondLst>
+                                  <p:childTnLst>
+                                    <p:set>
+                                      <p:cBhvr>
+                                        <p:cTn id="14" dur="1" fill="hold">
+                                          <p:stCondLst>
+                                            <p:cond delay="0"/>
+                                          </p:stCondLst>
+                                        </p:cTn>
+                                        <p:tgtEl>
+                                          <p:spTgt spid="15"/>
+                                        </p:tgtEl>
+                                        <p:attrNameLst>
+                                          <p:attrName>style.visibility</p:attrName>
+                                        </p:attrNameLst>
+                                      </p:cBhvr>
+                                      <p:to>
+                                        <p:strVal val="visible"/>
+                                      </p:to>
+                                    </p:set>
+                                    <p:anim calcmode="lin" valueType="num">
+                                      <p:cBhvr>
+                                        <p:cTn id="15" dur="500" fill="hold"/>
+                                        <p:tgtEl>
+                                          <p:spTgt spid="15"/>
+                                        </p:tgtEl>
+                                        <p:attrNameLst>
+                                          <p:attrName>ppt_w</p:attrName>
+                                        </p:attrNameLst>
+                                      </p:cBhvr>
+                                      <p:tavLst>
+                                        <p:tav tm="0">
+                                          <p:val>
+                                            <p:fltVal val="0"/>
+                                          </p:val>
+                                        </p:tav>
+                                        <p:tav tm="100000">
+                                          <p:val>
+                                            <p:strVal val="#ppt_w"/>
+                                          </p:val>
+                                        </p:tav>
+                                      </p:tavLst>
+                                    </p:anim>
+                                    <p:anim calcmode="lin" valueType="num">
+                                      <p:cBhvr>
+                                        <p:cTn id="16" dur="500" fill="hold"/>
+                                        <p:tgtEl>
+                                          <p:spTgt spid="15"/>
+                                        </p:tgtEl>
+                                        <p:attrNameLst>
+                                          <p:attrName>ppt_h</p:attrName>
+                                        </p:attrNameLst>
+                                      </p:cBhvr>
+                                      <p:tavLst>
+                                        <p:tav tm="0">
+                                          <p:val>
+                                            <p:fltVal val="0"/>
+                                          </p:val>
+                                        </p:tav>
+                                        <p:tav tm="100000">
+                                          <p:val>
+                                            <p:strVal val="#ppt_h"/>
+                                          </p:val>
+                                        </p:tav>
+                                      </p:tavLst>
+                                    </p:anim>
+                                    <p:animEffect transition="in" filter="fade">
+                                      <p:cBhvr>
+                                        <p:cTn id="17" dur="500"/>
+                                        <p:tgtEl>
+                                          <p:spTgt spid="15"/>
+                                        </p:tgtEl>
+                                      </p:cBhvr>
+                                    </p:animEffect>
+                                  </p:childTnLst>
+                                </p:cTn>
+                              </p:par>
+                              <p:par>
+                                <p:cTn id="18" presetID="10" presetClass="exit" presetSubtype="0" fill="hold" grpId="1" nodeType="withEffect">
+                                  <p:stCondLst>
+                                    <p:cond delay="500"/>
+                                  </p:stCondLst>
+                                  <p:childTnLst>
+                                    <p:animEffect transition="out" filter="fade">
+                                      <p:cBhvr>
+                                        <p:cTn id="19" dur="500"/>
+                                        <p:tgtEl>
+                                          <p:spTgt spid="15"/>
+                                        </p:tgtEl>
+                                      </p:cBhvr>
+                                    </p:animEffect>
+                                    <p:set>
+                                      <p:cBhvr>
+                                        <p:cTn id="20" dur="1" fill="hold">
+                                          <p:stCondLst>
+                                            <p:cond delay="499"/>
+                                          </p:stCondLst>
+                                        </p:cTn>
+                                        <p:tgtEl>
+                                          <p:spTgt spid="15"/>
+                                        </p:tgtEl>
+                                        <p:attrNameLst>
+                                          <p:attrName>style.visibility</p:attrName>
+                                        </p:attrNameLst>
+                                      </p:cBhvr>
+                                      <p:to>
+                                        <p:strVal val="hidden"/>
+                                      </p:to>
+                                    </p:set>
+                                  </p:childTnLst>
+                                </p:cTn>
+                              </p:par>
+                              <p:par>
+                                <p:cTn id="21" presetID="53" presetClass="entr" presetSubtype="16" fill="hold" grpId="0" nodeType="withEffect">
+                                  <p:stCondLst>
+                                    <p:cond delay="500"/>
+                                  </p:stCondLst>
+                                  <p:childTnLst>
+                                    <p:set>
+                                      <p:cBhvr>
+                                        <p:cTn id="22" dur="1" fill="hold">
+                                          <p:stCondLst>
+                                            <p:cond delay="0"/>
+                                          </p:stCondLst>
+                                        </p:cTn>
+                                        <p:tgtEl>
+                                          <p:spTgt spid="16"/>
+                                        </p:tgtEl>
+                                        <p:attrNameLst>
+                                          <p:attrName>style.visibility</p:attrName>
+                                        </p:attrNameLst>
+                                      </p:cBhvr>
+                                      <p:to>
+                                        <p:strVal val="visible"/>
+                                      </p:to>
+                                    </p:set>
+                                    <p:anim calcmode="lin" valueType="num">
+                                      <p:cBhvr>
+                                        <p:cTn id="23" dur="500" fill="hold"/>
+                                        <p:tgtEl>
+                                          <p:spTgt spid="16"/>
+                                        </p:tgtEl>
+                                        <p:attrNameLst>
+                                          <p:attrName>ppt_w</p:attrName>
+                                        </p:attrNameLst>
+                                      </p:cBhvr>
+                                      <p:tavLst>
+                                        <p:tav tm="0">
+                                          <p:val>
+                                            <p:fltVal val="0"/>
+                                          </p:val>
+                                        </p:tav>
+                                        <p:tav tm="100000">
+                                          <p:val>
+                                            <p:strVal val="#ppt_w"/>
+                                          </p:val>
+                                        </p:tav>
+                                      </p:tavLst>
+                                    </p:anim>
+                                    <p:anim calcmode="lin" valueType="num">
+                                      <p:cBhvr>
+                                        <p:cTn id="24" dur="500" fill="hold"/>
+                                        <p:tgtEl>
+                                          <p:spTgt spid="16"/>
+                                        </p:tgtEl>
+                                        <p:attrNameLst>
+                                          <p:attrName>ppt_h</p:attrName>
+                                        </p:attrNameLst>
+                                      </p:cBhvr>
+                                      <p:tavLst>
+                                        <p:tav tm="0">
+                                          <p:val>
+                                            <p:fltVal val="0"/>
+                                          </p:val>
+                                        </p:tav>
+                                        <p:tav tm="100000">
+                                          <p:val>
+                                            <p:strVal val="#ppt_h"/>
+                                          </p:val>
+                                        </p:tav>
+                                      </p:tavLst>
+                                    </p:anim>
+                                    <p:animEffect transition="in" filter="fade">
+                                      <p:cBhvr>
+                                        <p:cTn id="25" dur="500"/>
+                                        <p:tgtEl>
+                                          <p:spTgt spid="16"/>
+                                        </p:tgtEl>
+                                      </p:cBhvr>
+                                    </p:animEffect>
+                                  </p:childTnLst>
+                                </p:cTn>
+                              </p:par>
+                              <p:par>
+                                <p:cTn id="26" presetID="10" presetClass="exit" presetSubtype="0" fill="hold" grpId="1" nodeType="withEffect">
+                                  <p:stCondLst>
+                                    <p:cond delay="750"/>
+                                  </p:stCondLst>
+                                  <p:childTnLst>
+                                    <p:animEffect transition="out" filter="fade">
+                                      <p:cBhvr>
+                                        <p:cTn id="27" dur="500"/>
+                                        <p:tgtEl>
+                                          <p:spTgt spid="16"/>
+                                        </p:tgtEl>
+                                      </p:cBhvr>
+                                    </p:animEffect>
+                                    <p:set>
+                                      <p:cBhvr>
+                                        <p:cTn id="28" dur="1" fill="hold">
+                                          <p:stCondLst>
+                                            <p:cond delay="499"/>
+                                          </p:stCondLst>
+                                        </p:cTn>
+                                        <p:tgtEl>
+                                          <p:spTgt spid="16"/>
+                                        </p:tgtEl>
+                                        <p:attrNameLst>
+                                          <p:attrName>style.visibility</p:attrName>
+                                        </p:attrNameLst>
+                                      </p:cBhvr>
+                                      <p:to>
+                                        <p:strVal val="hidden"/>
+                                      </p:to>
+                                    </p:set>
+                                  </p:childTnLst>
+                                </p:cTn>
+                              </p:par>
+                              <p:par>
+                                <p:cTn id="29" presetID="53" presetClass="entr" presetSubtype="16" fill="hold" grpId="0" nodeType="withEffect">
+                                  <p:stCondLst>
+                                    <p:cond delay="0"/>
+                                  </p:stCondLst>
+                                  <p:childTnLst>
+                                    <p:set>
+                                      <p:cBhvr>
+                                        <p:cTn id="30" dur="1" fill="hold">
+                                          <p:stCondLst>
+                                            <p:cond delay="0"/>
+                                          </p:stCondLst>
+                                        </p:cTn>
+                                        <p:tgtEl>
+                                          <p:spTgt spid="10"/>
+                                        </p:tgtEl>
+                                        <p:attrNameLst>
+                                          <p:attrName>style.visibility</p:attrName>
+                                        </p:attrNameLst>
+                                      </p:cBhvr>
+                                      <p:to>
+                                        <p:strVal val="visible"/>
+                                      </p:to>
+                                    </p:set>
+                                    <p:anim calcmode="lin" valueType="num">
+                                      <p:cBhvr>
+                                        <p:cTn id="31" dur="500" fill="hold"/>
+                                        <p:tgtEl>
+                                          <p:spTgt spid="10"/>
+                                        </p:tgtEl>
+                                        <p:attrNameLst>
+                                          <p:attrName>ppt_w</p:attrName>
+                                        </p:attrNameLst>
+                                      </p:cBhvr>
+                                      <p:tavLst>
+                                        <p:tav tm="0">
+                                          <p:val>
+                                            <p:fltVal val="0"/>
+                                          </p:val>
+                                        </p:tav>
+                                        <p:tav tm="100000">
+                                          <p:val>
+                                            <p:strVal val="#ppt_w"/>
+                                          </p:val>
+                                        </p:tav>
+                                      </p:tavLst>
+                                    </p:anim>
+                                    <p:anim calcmode="lin" valueType="num">
+                                      <p:cBhvr>
+                                        <p:cTn id="32" dur="500" fill="hold"/>
+                                        <p:tgtEl>
+                                          <p:spTgt spid="10"/>
+                                        </p:tgtEl>
+                                        <p:attrNameLst>
+                                          <p:attrName>ppt_h</p:attrName>
+                                        </p:attrNameLst>
+                                      </p:cBhvr>
+                                      <p:tavLst>
+                                        <p:tav tm="0">
+                                          <p:val>
+                                            <p:fltVal val="0"/>
+                                          </p:val>
+                                        </p:tav>
+                                        <p:tav tm="100000">
+                                          <p:val>
+                                            <p:strVal val="#ppt_h"/>
+                                          </p:val>
+                                        </p:tav>
+                                      </p:tavLst>
+                                    </p:anim>
+                                    <p:animEffect transition="in" filter="fade">
+                                      <p:cBhvr>
+                                        <p:cTn id="33" dur="500"/>
+                                        <p:tgtEl>
+                                          <p:spTgt spid="10"/>
+                                        </p:tgtEl>
+                                      </p:cBhvr>
+                                    </p:animEffect>
+                                  </p:childTnLst>
+                                </p:cTn>
+                              </p:par>
+                              <p:par>
+                                <p:cTn id="34" presetID="10" presetClass="exit" presetSubtype="0" fill="hold" grpId="1" nodeType="withEffect">
+                                  <p:stCondLst>
+                                    <p:cond delay="250"/>
+                                  </p:stCondLst>
+                                  <p:childTnLst>
+                                    <p:animEffect transition="out" filter="fade">
+                                      <p:cBhvr>
+                                        <p:cTn id="35" dur="500"/>
+                                        <p:tgtEl>
+                                          <p:spTgt spid="10"/>
+                                        </p:tgtEl>
+                                      </p:cBhvr>
+                                    </p:animEffect>
+                                    <p:set>
+                                      <p:cBhvr>
+                                        <p:cTn id="36" dur="1" fill="hold">
+                                          <p:stCondLst>
+                                            <p:cond delay="499"/>
+                                          </p:stCondLst>
+                                        </p:cTn>
+                                        <p:tgtEl>
+                                          <p:spTgt spid="10"/>
+                                        </p:tgtEl>
+                                        <p:attrNameLst>
+                                          <p:attrName>style.visibility</p:attrName>
+                                        </p:attrNameLst>
+                                      </p:cBhvr>
+                                      <p:to>
+                                        <p:strVal val="hidden"/>
+                                      </p:to>
+                                    </p:set>
+                                  </p:childTnLst>
+                                </p:cTn>
+                              </p:par>
+                              <p:par>
+                                <p:cTn id="37" presetID="53" presetClass="entr" presetSubtype="16" fill="hold" grpId="0" nodeType="withEffect">
+                                  <p:stCondLst>
+                                    <p:cond delay="250"/>
+                                  </p:stCondLst>
+                                  <p:childTnLst>
+                                    <p:set>
+                                      <p:cBhvr>
+                                        <p:cTn id="38" dur="1" fill="hold">
+                                          <p:stCondLst>
+                                            <p:cond delay="0"/>
+                                          </p:stCondLst>
+                                        </p:cTn>
+                                        <p:tgtEl>
+                                          <p:spTgt spid="11"/>
+                                        </p:tgtEl>
+                                        <p:attrNameLst>
+                                          <p:attrName>style.visibility</p:attrName>
+                                        </p:attrNameLst>
+                                      </p:cBhvr>
+                                      <p:to>
+                                        <p:strVal val="visible"/>
+                                      </p:to>
+                                    </p:set>
+                                    <p:anim calcmode="lin" valueType="num">
+                                      <p:cBhvr>
+                                        <p:cTn id="39" dur="500" fill="hold"/>
+                                        <p:tgtEl>
+                                          <p:spTgt spid="11"/>
+                                        </p:tgtEl>
+                                        <p:attrNameLst>
+                                          <p:attrName>ppt_w</p:attrName>
+                                        </p:attrNameLst>
+                                      </p:cBhvr>
+                                      <p:tavLst>
+                                        <p:tav tm="0">
+                                          <p:val>
+                                            <p:fltVal val="0"/>
+                                          </p:val>
+                                        </p:tav>
+                                        <p:tav tm="100000">
+                                          <p:val>
+                                            <p:strVal val="#ppt_w"/>
+                                          </p:val>
+                                        </p:tav>
+                                      </p:tavLst>
+                                    </p:anim>
+                                    <p:anim calcmode="lin" valueType="num">
+                                      <p:cBhvr>
+                                        <p:cTn id="40" dur="500" fill="hold"/>
+                                        <p:tgtEl>
+                                          <p:spTgt spid="11"/>
+                                        </p:tgtEl>
+                                        <p:attrNameLst>
+                                          <p:attrName>ppt_h</p:attrName>
+                                        </p:attrNameLst>
+                                      </p:cBhvr>
+                                      <p:tavLst>
+                                        <p:tav tm="0">
+                                          <p:val>
+                                            <p:fltVal val="0"/>
+                                          </p:val>
+                                        </p:tav>
+                                        <p:tav tm="100000">
+                                          <p:val>
+                                            <p:strVal val="#ppt_h"/>
+                                          </p:val>
+                                        </p:tav>
+                                      </p:tavLst>
+                                    </p:anim>
+                                    <p:animEffect transition="in" filter="fade">
+                                      <p:cBhvr>
+                                        <p:cTn id="41" dur="500"/>
+                                        <p:tgtEl>
+                                          <p:spTgt spid="11"/>
+                                        </p:tgtEl>
+                                      </p:cBhvr>
+                                    </p:animEffect>
+                                  </p:childTnLst>
+                                </p:cTn>
+                              </p:par>
+                              <p:par>
+                                <p:cTn id="42" presetID="10" presetClass="exit" presetSubtype="0" fill="hold" grpId="1" nodeType="withEffect">
+                                  <p:stCondLst>
+                                    <p:cond delay="500"/>
+                                  </p:stCondLst>
+                                  <p:childTnLst>
+                                    <p:animEffect transition="out" filter="fade">
+                                      <p:cBhvr>
+                                        <p:cTn id="43" dur="500"/>
+                                        <p:tgtEl>
+                                          <p:spTgt spid="11"/>
+                                        </p:tgtEl>
+                                      </p:cBhvr>
+                                    </p:animEffect>
+                                    <p:set>
+                                      <p:cBhvr>
+                                        <p:cTn id="44" dur="1" fill="hold">
+                                          <p:stCondLst>
+                                            <p:cond delay="499"/>
+                                          </p:stCondLst>
+                                        </p:cTn>
+                                        <p:tgtEl>
+                                          <p:spTgt spid="11"/>
+                                        </p:tgtEl>
+                                        <p:attrNameLst>
+                                          <p:attrName>style.visibility</p:attrName>
+                                        </p:attrNameLst>
+                                      </p:cBhvr>
+                                      <p:to>
+                                        <p:strVal val="hidden"/>
+                                      </p:to>
+                                    </p:set>
+                                  </p:childTnLst>
+                                </p:cTn>
+                              </p:par>
+                              <p:par>
+                                <p:cTn id="45" presetID="53" presetClass="entr" presetSubtype="16" fill="hold" grpId="0" nodeType="withEffect">
+                                  <p:stCondLst>
+                                    <p:cond delay="500"/>
+                                  </p:stCondLst>
+                                  <p:childTnLst>
+                                    <p:set>
+                                      <p:cBhvr>
+                                        <p:cTn id="46" dur="1" fill="hold">
+                                          <p:stCondLst>
+                                            <p:cond delay="0"/>
+                                          </p:stCondLst>
+                                        </p:cTn>
+                                        <p:tgtEl>
+                                          <p:spTgt spid="12"/>
+                                        </p:tgtEl>
+                                        <p:attrNameLst>
+                                          <p:attrName>style.visibility</p:attrName>
+                                        </p:attrNameLst>
+                                      </p:cBhvr>
+                                      <p:to>
+                                        <p:strVal val="visible"/>
+                                      </p:to>
+                                    </p:set>
+                                    <p:anim calcmode="lin" valueType="num">
+                                      <p:cBhvr>
+                                        <p:cTn id="47" dur="500" fill="hold"/>
+                                        <p:tgtEl>
+                                          <p:spTgt spid="12"/>
+                                        </p:tgtEl>
+                                        <p:attrNameLst>
+                                          <p:attrName>ppt_w</p:attrName>
+                                        </p:attrNameLst>
+                                      </p:cBhvr>
+                                      <p:tavLst>
+                                        <p:tav tm="0">
+                                          <p:val>
+                                            <p:fltVal val="0"/>
+                                          </p:val>
+                                        </p:tav>
+                                        <p:tav tm="100000">
+                                          <p:val>
+                                            <p:strVal val="#ppt_w"/>
+                                          </p:val>
+                                        </p:tav>
+                                      </p:tavLst>
+                                    </p:anim>
+                                    <p:anim calcmode="lin" valueType="num">
+                                      <p:cBhvr>
+                                        <p:cTn id="48" dur="500" fill="hold"/>
+                                        <p:tgtEl>
+                                          <p:spTgt spid="12"/>
+                                        </p:tgtEl>
+                                        <p:attrNameLst>
+                                          <p:attrName>ppt_h</p:attrName>
+                                        </p:attrNameLst>
+                                      </p:cBhvr>
+                                      <p:tavLst>
+                                        <p:tav tm="0">
+                                          <p:val>
+                                            <p:fltVal val="0"/>
+                                          </p:val>
+                                        </p:tav>
+                                        <p:tav tm="100000">
+                                          <p:val>
+                                            <p:strVal val="#ppt_h"/>
+                                          </p:val>
+                                        </p:tav>
+                                      </p:tavLst>
+                                    </p:anim>
+                                    <p:animEffect transition="in" filter="fade">
+                                      <p:cBhvr>
+                                        <p:cTn id="49" dur="500"/>
+                                        <p:tgtEl>
+                                          <p:spTgt spid="12"/>
+                                        </p:tgtEl>
+                                      </p:cBhvr>
+                                    </p:animEffect>
+                                  </p:childTnLst>
+                                </p:cTn>
+                              </p:par>
+                              <p:par>
+                                <p:cTn id="50" presetID="10" presetClass="exit" presetSubtype="0" fill="hold" grpId="1" nodeType="withEffect">
+                                  <p:stCondLst>
+                                    <p:cond delay="750"/>
+                                  </p:stCondLst>
+                                  <p:childTnLst>
+                                    <p:animEffect transition="out" filter="fade">
+                                      <p:cBhvr>
+                                        <p:cTn id="51" dur="500"/>
+                                        <p:tgtEl>
+                                          <p:spTgt spid="12"/>
+                                        </p:tgtEl>
+                                      </p:cBhvr>
+                                    </p:animEffect>
+                                    <p:set>
+                                      <p:cBhvr>
+                                        <p:cTn id="52" dur="1" fill="hold">
+                                          <p:stCondLst>
+                                            <p:cond delay="499"/>
+                                          </p:stCondLst>
+                                        </p:cTn>
+                                        <p:tgtEl>
+                                          <p:spTgt spid="12"/>
+                                        </p:tgtEl>
+                                        <p:attrNameLst>
+                                          <p:attrName>style.visibility</p:attrName>
+                                        </p:attrNameLst>
+                                      </p:cBhvr>
+                                      <p:to>
+                                        <p:strVal val="hidden"/>
+                                      </p:to>
+                                    </p:set>
+                                  </p:childTnLst>
+                                </p:cTn>
+                              </p:par>
+                            </p:childTnLst>
+                          </p:cTn>
+                        </p:par>
+                        <p:par>
+                          <p:cTn id="53" fill="hold">
+                            <p:stCondLst>
+                              <p:cond delay="1250"/>
+                            </p:stCondLst>
+                            <p:childTnLst>
+                              <p:par>
+                                <p:cTn id="54" presetID="1" presetClass="entr" presetSubtype="0" fill="hold" grpId="0" nodeType="afterEffect">
+                                  <p:stCondLst>
+                                    <p:cond delay="0"/>
+                                  </p:stCondLst>
+                                  <p:childTnLst>
+                                    <p:set>
+                                      <p:cBhvr>
+                                        <p:cTn id="55" dur="1" fill="hold">
+                                          <p:stCondLst>
+                                            <p:cond delay="0"/>
+                                          </p:stCondLst>
+                                        </p:cTn>
+                                        <p:tgtEl>
+                                          <p:spTgt spid="19"/>
+                                        </p:tgtEl>
+                                        <p:attrNameLst>
+                                          <p:attrName>style.visibility</p:attrName>
+                                        </p:attrNameLst>
+                                      </p:cBhvr>
+                                      <p:to>
+                                        <p:strVal val="visible"/>
+                                      </p:to>
+                                    </p:set>
+                                  </p:childTnLst>
+                                </p:cTn>
+                              </p:par>
+                            </p:childTnLst>
+                          </p:cTn>
+                        </p:par>
+                        <p:par>
+                          <p:cTn id="56" fill="hold">
+                            <p:stCondLst>
+                              <p:cond delay="1250"/>
+                            </p:stCondLst>
+                            <p:childTnLst>
+                              <p:par>
+                                <p:cTn id="57" presetID="2" presetClass="entr" presetSubtype="1" decel="100000" fill="hold" grpId="0" nodeType="afterEffect">
+                                  <p:stCondLst>
+                                    <p:cond delay="0"/>
+                                  </p:stCondLst>
+                                  <p:childTnLst>
+                                    <p:set>
+                                      <p:cBhvr>
+                                        <p:cTn id="58" dur="1" fill="hold">
+                                          <p:stCondLst>
+                                            <p:cond delay="0"/>
+                                          </p:stCondLst>
+                                        </p:cTn>
+                                        <p:tgtEl>
+                                          <p:spTgt spid="46"/>
+                                        </p:tgtEl>
+                                        <p:attrNameLst>
+                                          <p:attrName>style.visibility</p:attrName>
+                                        </p:attrNameLst>
+                                      </p:cBhvr>
+                                      <p:to>
+                                        <p:strVal val="visible"/>
+                                      </p:to>
+                                    </p:set>
+                                    <p:anim calcmode="lin" valueType="num">
+                                      <p:cBhvr additive="base">
+                                        <p:cTn id="59" dur="650" fill="hold"/>
+                                        <p:tgtEl>
+                                          <p:spTgt spid="46"/>
+                                        </p:tgtEl>
+                                        <p:attrNameLst>
+                                          <p:attrName>ppt_x</p:attrName>
+                                        </p:attrNameLst>
+                                      </p:cBhvr>
+                                      <p:tavLst>
+                                        <p:tav tm="0">
+                                          <p:val>
+                                            <p:strVal val="#ppt_x"/>
+                                          </p:val>
+                                        </p:tav>
+                                        <p:tav tm="100000">
+                                          <p:val>
+                                            <p:strVal val="#ppt_x"/>
+                                          </p:val>
+                                        </p:tav>
+                                      </p:tavLst>
+                                    </p:anim>
+                                    <p:anim calcmode="lin" valueType="num">
+                                      <p:cBhvr additive="base">
+                                        <p:cTn id="60" dur="650" fill="hold"/>
+                                        <p:tgtEl>
+                                          <p:spTgt spid="46"/>
+                                        </p:tgtEl>
+                                        <p:attrNameLst>
+                                          <p:attrName>ppt_y</p:attrName>
+                                        </p:attrNameLst>
+                                      </p:cBhvr>
+                                      <p:tavLst>
+                                        <p:tav tm="0">
+                                          <p:val>
+                                            <p:strVal val="0-#ppt_h/2"/>
+                                          </p:val>
+                                        </p:tav>
+                                        <p:tav tm="100000">
+                                          <p:val>
+                                            <p:strVal val="#ppt_y"/>
+                                          </p:val>
+                                        </p:tav>
+                                      </p:tavLst>
+                                    </p:anim>
+                                  </p:childTnLst>
+                                </p:cTn>
+                              </p:par>
+                            </p:childTnLst>
+                          </p:cTn>
+                        </p:par>
+                      </p:childTnLst>
+                    </p:cTn>
+                  </p:par>
+                </p:childTnLst>
+              </p:cTn>
+              <p:prevCondLst>
+                <p:cond evt="onPrev" delay="0">
+                  <p:tgtEl>
+                    <p:sldTgt/>
+                  </p:tgtEl>
+                </p:cond>
+              </p:prevCondLst>
+              <p:nextCondLst>
+                <p:cond evt="onNext" delay="0">
+                  <p:tgtEl>
+                    <p:sldTgt/>
+                  </p:tgtEl>
+                </p:cond>
+              </p:nextCondLst>
+            </p:seq>
+          </p:childTnLst>
+        </p:cTn>
+      </p:par>
+    </p:tnLst>
+    <p:bldLst>
+      <p:bldP spid="14" grpId="0" animBg="1"/>
+      <p:bldP spid="14" grpId="1" animBg="1"/>
+      <p:bldP spid="15" grpId="0" animBg="1"/>
+      <p:bldP spid="15" grpId="1" animBg="1"/>
+      <p:bldP spid="16" grpId="0" animBg="1"/>
+      <p:bldP spid="16" grpId="1" animBg="1"/>
+      <p:bldP spid="10" grpId="0" animBg="1"/>
+      <p:bldP spid="10" grpId="1" animBg="1"/>
+      <p:bldP spid="11" grpId="0" animBg="1"/>
+      <p:bldP spid="11" grpId="1" animBg="1"/>
+      <p:bldP spid="12" grpId="0" animBg="1"/>
+      <p:bldP spid="12" grpId="1" animBg="1"/>
+      <p:bldP spid="46" grpId="0" animBg="1"/>
+      <p:bldP spid="19" grpId="0" animBg="1"/>
+    </p:bldLst>
+  </p:timing>
 </p:sld>
 </file>
 
@@ -44871,6 +46979,9 @@
   <p:clrMapOvr>
     <a:masterClrMapping/>
   </p:clrMapOvr>
+  <p:transition spd="med">
+    <p:pull/>
+  </p:transition>
 </p:sld>
 </file>
 
@@ -45042,6 +47153,9 @@
   <p:clrMapOvr>
     <a:masterClrMapping/>
   </p:clrMapOvr>
+  <p:transition spd="med">
+    <p:pull/>
+  </p:transition>
 </p:sld>
 </file>
 
@@ -45281,7 +47395,7 @@
     <a:masterClrMapping/>
   </p:clrMapOvr>
   <p:transition spd="slow">
-    <p:push/>
+    <p:push dir="u"/>
   </p:transition>
 </p:sld>
 </file>

</xml_diff>